<commit_message>
tipografia y SELECT mascotas_disponibles - rescatadas
</commit_message>
<xml_diff>
--- a/Presentación Página Web Mascotas.pptx
+++ b/Presentación Página Web Mascotas.pptx
@@ -6,19 +6,16 @@
   </p:sldMasterIdLst>
   <p:sldIdLst>
     <p:sldId id="256" r:id="rId2"/>
-    <p:sldId id="269" r:id="rId3"/>
-    <p:sldId id="265" r:id="rId4"/>
-    <p:sldId id="270" r:id="rId5"/>
-    <p:sldId id="272" r:id="rId6"/>
-    <p:sldId id="271" r:id="rId7"/>
-    <p:sldId id="268" r:id="rId8"/>
-    <p:sldId id="261" r:id="rId9"/>
-    <p:sldId id="258" r:id="rId10"/>
-    <p:sldId id="260" r:id="rId11"/>
-    <p:sldId id="267" r:id="rId12"/>
-    <p:sldId id="263" r:id="rId13"/>
-    <p:sldId id="264" r:id="rId14"/>
-    <p:sldId id="266" r:id="rId15"/>
+    <p:sldId id="272" r:id="rId3"/>
+    <p:sldId id="271" r:id="rId4"/>
+    <p:sldId id="268" r:id="rId5"/>
+    <p:sldId id="261" r:id="rId6"/>
+    <p:sldId id="258" r:id="rId7"/>
+    <p:sldId id="260" r:id="rId8"/>
+    <p:sldId id="267" r:id="rId9"/>
+    <p:sldId id="263" r:id="rId10"/>
+    <p:sldId id="264" r:id="rId11"/>
+    <p:sldId id="266" r:id="rId12"/>
   </p:sldIdLst>
   <p:sldSz cx="12192000" cy="6858000"/>
   <p:notesSz cx="6858000" cy="9144000"/>
@@ -5392,7 +5389,7 @@
           <a:p>
             <a:fld id="{0D871F79-72A9-4122-96B9-A60E138C9C98}" type="datetimeFigureOut">
               <a:rPr lang="es-US" smtClean="0"/>
-              <a:t>2/3/2023</a:t>
+              <a:t>2/6/2023</a:t>
             </a:fld>
             <a:endParaRPr lang="es-US"/>
           </a:p>
@@ -5592,7 +5589,7 @@
           <a:p>
             <a:fld id="{0D871F79-72A9-4122-96B9-A60E138C9C98}" type="datetimeFigureOut">
               <a:rPr lang="es-US" smtClean="0"/>
-              <a:t>2/3/2023</a:t>
+              <a:t>2/6/2023</a:t>
             </a:fld>
             <a:endParaRPr lang="es-US"/>
           </a:p>
@@ -5802,7 +5799,7 @@
           <a:p>
             <a:fld id="{0D871F79-72A9-4122-96B9-A60E138C9C98}" type="datetimeFigureOut">
               <a:rPr lang="es-US" smtClean="0"/>
-              <a:t>2/3/2023</a:t>
+              <a:t>2/6/2023</a:t>
             </a:fld>
             <a:endParaRPr lang="es-US"/>
           </a:p>
@@ -6002,7 +5999,7 @@
           <a:p>
             <a:fld id="{0D871F79-72A9-4122-96B9-A60E138C9C98}" type="datetimeFigureOut">
               <a:rPr lang="es-US" smtClean="0"/>
-              <a:t>2/3/2023</a:t>
+              <a:t>2/6/2023</a:t>
             </a:fld>
             <a:endParaRPr lang="es-US"/>
           </a:p>
@@ -6278,7 +6275,7 @@
           <a:p>
             <a:fld id="{0D871F79-72A9-4122-96B9-A60E138C9C98}" type="datetimeFigureOut">
               <a:rPr lang="es-US" smtClean="0"/>
-              <a:t>2/3/2023</a:t>
+              <a:t>2/6/2023</a:t>
             </a:fld>
             <a:endParaRPr lang="es-US"/>
           </a:p>
@@ -6546,7 +6543,7 @@
           <a:p>
             <a:fld id="{0D871F79-72A9-4122-96B9-A60E138C9C98}" type="datetimeFigureOut">
               <a:rPr lang="es-US" smtClean="0"/>
-              <a:t>2/3/2023</a:t>
+              <a:t>2/6/2023</a:t>
             </a:fld>
             <a:endParaRPr lang="es-US"/>
           </a:p>
@@ -6961,7 +6958,7 @@
           <a:p>
             <a:fld id="{0D871F79-72A9-4122-96B9-A60E138C9C98}" type="datetimeFigureOut">
               <a:rPr lang="es-US" smtClean="0"/>
-              <a:t>2/3/2023</a:t>
+              <a:t>2/6/2023</a:t>
             </a:fld>
             <a:endParaRPr lang="es-US"/>
           </a:p>
@@ -7103,7 +7100,7 @@
           <a:p>
             <a:fld id="{0D871F79-72A9-4122-96B9-A60E138C9C98}" type="datetimeFigureOut">
               <a:rPr lang="es-US" smtClean="0"/>
-              <a:t>2/3/2023</a:t>
+              <a:t>2/6/2023</a:t>
             </a:fld>
             <a:endParaRPr lang="es-US"/>
           </a:p>
@@ -7216,7 +7213,7 @@
           <a:p>
             <a:fld id="{0D871F79-72A9-4122-96B9-A60E138C9C98}" type="datetimeFigureOut">
               <a:rPr lang="es-US" smtClean="0"/>
-              <a:t>2/3/2023</a:t>
+              <a:t>2/6/2023</a:t>
             </a:fld>
             <a:endParaRPr lang="es-US"/>
           </a:p>
@@ -7529,7 +7526,7 @@
           <a:p>
             <a:fld id="{0D871F79-72A9-4122-96B9-A60E138C9C98}" type="datetimeFigureOut">
               <a:rPr lang="es-US" smtClean="0"/>
-              <a:t>2/3/2023</a:t>
+              <a:t>2/6/2023</a:t>
             </a:fld>
             <a:endParaRPr lang="es-US"/>
           </a:p>
@@ -7818,7 +7815,7 @@
           <a:p>
             <a:fld id="{0D871F79-72A9-4122-96B9-A60E138C9C98}" type="datetimeFigureOut">
               <a:rPr lang="es-US" smtClean="0"/>
-              <a:t>2/3/2023</a:t>
+              <a:t>2/6/2023</a:t>
             </a:fld>
             <a:endParaRPr lang="es-US"/>
           </a:p>
@@ -8061,7 +8058,7 @@
           <a:p>
             <a:fld id="{0D871F79-72A9-4122-96B9-A60E138C9C98}" type="datetimeFigureOut">
               <a:rPr lang="es-US" smtClean="0"/>
-              <a:t>2/3/2023</a:t>
+              <a:t>2/6/2023</a:t>
             </a:fld>
             <a:endParaRPr lang="es-US"/>
           </a:p>
@@ -9104,924 +9101,6 @@
           <a:chExt cx="0" cy="0"/>
         </a:xfrm>
       </p:grpSpPr>
-      <p:pic>
-        <p:nvPicPr>
-          <p:cNvPr id="5122" name="Picture 2" descr="Web App Development Company, Web App Development Services">
-            <a:extLst>
-              <a:ext uri="{FF2B5EF4-FFF2-40B4-BE49-F238E27FC236}">
-                <a16:creationId xmlns:a16="http://schemas.microsoft.com/office/drawing/2014/main" id="{95275804-447F-45D7-A6AB-D5BC8B4F3358}"/>
-              </a:ext>
-            </a:extLst>
-          </p:cNvPr>
-          <p:cNvPicPr>
-            <a:picLocks noChangeAspect="1" noChangeArrowheads="1"/>
-          </p:cNvPicPr>
-          <p:nvPr/>
-        </p:nvPicPr>
-        <p:blipFill rotWithShape="1">
-          <a:blip r:embed="rId2">
-            <a:alphaModFix amt="40000"/>
-            <a:extLst>
-              <a:ext uri="{28A0092B-C50C-407E-A947-70E740481C1C}">
-                <a14:useLocalDpi xmlns:a14="http://schemas.microsoft.com/office/drawing/2010/main" val="0"/>
-              </a:ext>
-            </a:extLst>
-          </a:blip>
-          <a:srcRect r="1779" b="1"/>
-          <a:stretch/>
-        </p:blipFill>
-        <p:spPr bwMode="auto">
-          <a:xfrm>
-            <a:off x="20" y="10"/>
-            <a:ext cx="12191980" cy="6857990"/>
-          </a:xfrm>
-          <a:prstGeom prst="rect">
-            <a:avLst/>
-          </a:prstGeom>
-          <a:noFill/>
-          <a:extLst>
-            <a:ext uri="{909E8E84-426E-40DD-AFC4-6F175D3DCCD1}">
-              <a14:hiddenFill xmlns:a14="http://schemas.microsoft.com/office/drawing/2010/main">
-                <a:solidFill>
-                  <a:srgbClr val="FFFFFF"/>
-                </a:solidFill>
-              </a14:hiddenFill>
-            </a:ext>
-          </a:extLst>
-        </p:spPr>
-      </p:pic>
-      <p:sp>
-        <p:nvSpPr>
-          <p:cNvPr id="2" name="Título 1">
-            <a:extLst>
-              <a:ext uri="{FF2B5EF4-FFF2-40B4-BE49-F238E27FC236}">
-                <a16:creationId xmlns:a16="http://schemas.microsoft.com/office/drawing/2014/main" id="{1B821B62-3517-478E-A60E-C478029540AB}"/>
-              </a:ext>
-            </a:extLst>
-          </p:cNvPr>
-          <p:cNvSpPr>
-            <a:spLocks noGrp="1"/>
-          </p:cNvSpPr>
-          <p:nvPr>
-            <p:ph type="title"/>
-          </p:nvPr>
-        </p:nvSpPr>
-        <p:spPr>
-          <a:xfrm>
-            <a:off x="1621366" y="583755"/>
-            <a:ext cx="8949267" cy="2193269"/>
-          </a:xfrm>
-        </p:spPr>
-        <p:txBody>
-          <a:bodyPr vert="horz" lIns="91440" tIns="45720" rIns="91440" bIns="45720" rtlCol="0" anchor="b">
-            <a:normAutofit/>
-          </a:bodyPr>
-          <a:lstStyle/>
-          <a:p>
-            <a:r>
-              <a:rPr lang="en-US" sz="11500" dirty="0">
-                <a:ln w="22225">
-                  <a:solidFill>
-                    <a:schemeClr val="tx1"/>
-                  </a:solidFill>
-                  <a:miter lim="800000"/>
-                </a:ln>
-                <a:noFill/>
-              </a:rPr>
-              <a:t>Aplicativo web</a:t>
-            </a:r>
-          </a:p>
-        </p:txBody>
-      </p:sp>
-      <p:sp>
-        <p:nvSpPr>
-          <p:cNvPr id="3" name="Título 1">
-            <a:extLst>
-              <a:ext uri="{FF2B5EF4-FFF2-40B4-BE49-F238E27FC236}">
-                <a16:creationId xmlns:a16="http://schemas.microsoft.com/office/drawing/2014/main" id="{7C120193-6849-CE6D-6EBA-B24862DD107E}"/>
-              </a:ext>
-            </a:extLst>
-          </p:cNvPr>
-          <p:cNvSpPr txBox="1">
-            <a:spLocks/>
-          </p:cNvSpPr>
-          <p:nvPr/>
-        </p:nvSpPr>
-        <p:spPr>
-          <a:xfrm>
-            <a:off x="2303156" y="2777024"/>
-            <a:ext cx="8949267" cy="2193269"/>
-          </a:xfrm>
-          <a:prstGeom prst="rect">
-            <a:avLst/>
-          </a:prstGeom>
-        </p:spPr>
-        <p:txBody>
-          <a:bodyPr vert="horz" lIns="91440" tIns="45720" rIns="91440" bIns="45720" rtlCol="0" anchor="b">
-            <a:noAutofit/>
-          </a:bodyPr>
-          <a:lstStyle>
-            <a:lvl1pPr algn="l" defTabSz="914400" rtl="0" eaLnBrk="1" latinLnBrk="0" hangingPunct="1">
-              <a:lnSpc>
-                <a:spcPct val="90000"/>
-              </a:lnSpc>
-              <a:spcBef>
-                <a:spcPct val="0"/>
-              </a:spcBef>
-              <a:buNone/>
-              <a:defRPr sz="4400" kern="1200">
-                <a:solidFill>
-                  <a:schemeClr val="tx1"/>
-                </a:solidFill>
-                <a:latin typeface="+mj-lt"/>
-                <a:ea typeface="+mj-ea"/>
-                <a:cs typeface="+mj-cs"/>
-              </a:defRPr>
-            </a:lvl1pPr>
-          </a:lstStyle>
-          <a:p>
-            <a:r>
-              <a:rPr lang="en-US" sz="4800" dirty="0">
-                <a:ln w="22225">
-                  <a:solidFill>
-                    <a:schemeClr val="tx1"/>
-                  </a:solidFill>
-                  <a:miter lim="800000"/>
-                </a:ln>
-                <a:noFill/>
-              </a:rPr>
-              <a:t>Desarrollo e implementaciòn</a:t>
-            </a:r>
-          </a:p>
-        </p:txBody>
-      </p:sp>
-    </p:spTree>
-    <p:extLst>
-      <p:ext uri="{BB962C8B-B14F-4D97-AF65-F5344CB8AC3E}">
-        <p14:creationId xmlns:p14="http://schemas.microsoft.com/office/powerpoint/2010/main" val="767735173"/>
-      </p:ext>
-    </p:extLst>
-  </p:cSld>
-  <p:clrMapOvr>
-    <a:overrideClrMapping bg1="dk1" tx1="lt1" bg2="dk2" tx2="lt2" accent1="accent1" accent2="accent2" accent3="accent3" accent4="accent4" accent5="accent5" accent6="accent6" hlink="hlink" folHlink="folHlink"/>
-  </p:clrMapOvr>
-  <p:timing>
-    <p:tnLst>
-      <p:par>
-        <p:cTn id="1" dur="indefinite" restart="never" nodeType="tmRoot">
-          <p:childTnLst>
-            <p:seq concurrent="1" nextAc="seek">
-              <p:cTn id="2" dur="indefinite" nodeType="mainSeq">
-                <p:childTnLst>
-                  <p:par>
-                    <p:cTn id="3" fill="hold">
-                      <p:stCondLst>
-                        <p:cond delay="indefinite"/>
-                        <p:cond evt="onBegin" delay="0">
-                          <p:tn val="2"/>
-                        </p:cond>
-                      </p:stCondLst>
-                      <p:childTnLst>
-                        <p:par>
-                          <p:cTn id="4" fill="hold">
-                            <p:stCondLst>
-                              <p:cond delay="0"/>
-                            </p:stCondLst>
-                            <p:childTnLst>
-                              <p:par>
-                                <p:cTn id="5" presetID="10" presetClass="entr" presetSubtype="0" fill="hold" grpId="0" nodeType="withEffect">
-                                  <p:stCondLst>
-                                    <p:cond delay="1000"/>
-                                  </p:stCondLst>
-                                  <p:iterate type="lt">
-                                    <p:tmPct val="10000"/>
-                                  </p:iterate>
-                                  <p:childTnLst>
-                                    <p:set>
-                                      <p:cBhvr>
-                                        <p:cTn id="6" dur="1" fill="hold">
-                                          <p:stCondLst>
-                                            <p:cond delay="0"/>
-                                          </p:stCondLst>
-                                        </p:cTn>
-                                        <p:tgtEl>
-                                          <p:spTgt spid="2"/>
-                                        </p:tgtEl>
-                                        <p:attrNameLst>
-                                          <p:attrName>style.visibility</p:attrName>
-                                        </p:attrNameLst>
-                                      </p:cBhvr>
-                                      <p:to>
-                                        <p:strVal val="visible"/>
-                                      </p:to>
-                                    </p:set>
-                                    <p:animEffect transition="in" filter="fade">
-                                      <p:cBhvr>
-                                        <p:cTn id="7" dur="400"/>
-                                        <p:tgtEl>
-                                          <p:spTgt spid="2"/>
-                                        </p:tgtEl>
-                                      </p:cBhvr>
-                                    </p:animEffect>
-                                  </p:childTnLst>
-                                </p:cTn>
-                              </p:par>
-                              <p:par>
-                                <p:cTn id="8" presetID="10" presetClass="entr" presetSubtype="0" fill="hold" grpId="0" nodeType="withEffect">
-                                  <p:stCondLst>
-                                    <p:cond delay="1000"/>
-                                  </p:stCondLst>
-                                  <p:iterate type="lt">
-                                    <p:tmPct val="10000"/>
-                                  </p:iterate>
-                                  <p:childTnLst>
-                                    <p:set>
-                                      <p:cBhvr>
-                                        <p:cTn id="9" dur="1" fill="hold">
-                                          <p:stCondLst>
-                                            <p:cond delay="0"/>
-                                          </p:stCondLst>
-                                        </p:cTn>
-                                        <p:tgtEl>
-                                          <p:spTgt spid="3"/>
-                                        </p:tgtEl>
-                                        <p:attrNameLst>
-                                          <p:attrName>style.visibility</p:attrName>
-                                        </p:attrNameLst>
-                                      </p:cBhvr>
-                                      <p:to>
-                                        <p:strVal val="visible"/>
-                                      </p:to>
-                                    </p:set>
-                                    <p:animEffect transition="in" filter="fade">
-                                      <p:cBhvr>
-                                        <p:cTn id="10" dur="400"/>
-                                        <p:tgtEl>
-                                          <p:spTgt spid="3"/>
-                                        </p:tgtEl>
-                                      </p:cBhvr>
-                                    </p:animEffect>
-                                  </p:childTnLst>
-                                </p:cTn>
-                              </p:par>
-                            </p:childTnLst>
-                          </p:cTn>
-                        </p:par>
-                      </p:childTnLst>
-                    </p:cTn>
-                  </p:par>
-                </p:childTnLst>
-              </p:cTn>
-              <p:prevCondLst>
-                <p:cond evt="onPrev" delay="0">
-                  <p:tgtEl>
-                    <p:sldTgt/>
-                  </p:tgtEl>
-                </p:cond>
-              </p:prevCondLst>
-              <p:nextCondLst>
-                <p:cond evt="onNext" delay="0">
-                  <p:tgtEl>
-                    <p:sldTgt/>
-                  </p:tgtEl>
-                </p:cond>
-              </p:nextCondLst>
-            </p:seq>
-          </p:childTnLst>
-        </p:cTn>
-      </p:par>
-    </p:tnLst>
-    <p:bldLst>
-      <p:bldP spid="2" grpId="0"/>
-      <p:bldP spid="3" grpId="0"/>
-    </p:bldLst>
-  </p:timing>
-</p:sld>
-</file>
-
-<file path=ppt/slides/slide11.xml><?xml version="1.0" encoding="utf-8"?>
-<p:sld xmlns:a="http://schemas.openxmlformats.org/drawingml/2006/main" xmlns:r="http://schemas.openxmlformats.org/officeDocument/2006/relationships" xmlns:p="http://schemas.openxmlformats.org/presentationml/2006/main">
-  <p:cSld>
-    <p:bg>
-      <p:bgPr>
-        <a:solidFill>
-          <a:schemeClr val="bg1"/>
-        </a:solidFill>
-        <a:effectLst/>
-      </p:bgPr>
-    </p:bg>
-    <p:spTree>
-      <p:nvGrpSpPr>
-        <p:cNvPr id="1" name=""/>
-        <p:cNvGrpSpPr/>
-        <p:nvPr/>
-      </p:nvGrpSpPr>
-      <p:grpSpPr>
-        <a:xfrm>
-          <a:off x="0" y="0"/>
-          <a:ext cx="0" cy="0"/>
-          <a:chOff x="0" y="0"/>
-          <a:chExt cx="0" cy="0"/>
-        </a:xfrm>
-      </p:grpSpPr>
-      <p:pic>
-        <p:nvPicPr>
-          <p:cNvPr id="1026" name="Picture 2" descr="Qué es Hosting y Dominio? | Magazine">
-            <a:extLst>
-              <a:ext uri="{FF2B5EF4-FFF2-40B4-BE49-F238E27FC236}">
-                <a16:creationId xmlns:a16="http://schemas.microsoft.com/office/drawing/2014/main" id="{F22A3745-61E3-602A-4178-C886D8F35FC5}"/>
-              </a:ext>
-            </a:extLst>
-          </p:cNvPr>
-          <p:cNvPicPr>
-            <a:picLocks noChangeAspect="1" noChangeArrowheads="1"/>
-          </p:cNvPicPr>
-          <p:nvPr/>
-        </p:nvPicPr>
-        <p:blipFill>
-          <a:blip r:embed="rId2">
-            <a:extLst>
-              <a:ext uri="{28A0092B-C50C-407E-A947-70E740481C1C}">
-                <a14:useLocalDpi xmlns:a14="http://schemas.microsoft.com/office/drawing/2010/main" val="0"/>
-              </a:ext>
-            </a:extLst>
-          </a:blip>
-          <a:srcRect/>
-          <a:stretch>
-            <a:fillRect/>
-          </a:stretch>
-        </p:blipFill>
-        <p:spPr bwMode="auto">
-          <a:xfrm>
-            <a:off x="0" y="238358"/>
-            <a:ext cx="12137740" cy="6094413"/>
-          </a:xfrm>
-          <a:prstGeom prst="rect">
-            <a:avLst/>
-          </a:prstGeom>
-          <a:noFill/>
-          <a:extLst>
-            <a:ext uri="{909E8E84-426E-40DD-AFC4-6F175D3DCCD1}">
-              <a14:hiddenFill xmlns:a14="http://schemas.microsoft.com/office/drawing/2010/main">
-                <a:solidFill>
-                  <a:srgbClr val="FFFFFF"/>
-                </a:solidFill>
-              </a14:hiddenFill>
-            </a:ext>
-          </a:extLst>
-        </p:spPr>
-      </p:pic>
-      <p:sp>
-        <p:nvSpPr>
-          <p:cNvPr id="2" name="Título 1">
-            <a:extLst>
-              <a:ext uri="{FF2B5EF4-FFF2-40B4-BE49-F238E27FC236}">
-                <a16:creationId xmlns:a16="http://schemas.microsoft.com/office/drawing/2014/main" id="{1B821B62-3517-478E-A60E-C478029540AB}"/>
-              </a:ext>
-            </a:extLst>
-          </p:cNvPr>
-          <p:cNvSpPr>
-            <a:spLocks noGrp="1"/>
-          </p:cNvSpPr>
-          <p:nvPr>
-            <p:ph type="title"/>
-          </p:nvPr>
-        </p:nvSpPr>
-        <p:spPr>
-          <a:xfrm>
-            <a:off x="3781861" y="72768"/>
-            <a:ext cx="4169834" cy="1745033"/>
-          </a:xfrm>
-        </p:spPr>
-        <p:txBody>
-          <a:bodyPr vert="horz" lIns="91440" tIns="45720" rIns="91440" bIns="45720" rtlCol="0" anchor="b">
-            <a:normAutofit fontScale="90000"/>
-          </a:bodyPr>
-          <a:lstStyle/>
-          <a:p>
-            <a:r>
-              <a:rPr lang="es-EC" sz="11500" dirty="0">
-                <a:ln w="22225">
-                  <a:solidFill>
-                    <a:schemeClr val="tx1"/>
-                  </a:solidFill>
-                  <a:miter lim="800000"/>
-                </a:ln>
-                <a:noFill/>
-              </a:rPr>
-              <a:t>Valores</a:t>
-            </a:r>
-          </a:p>
-        </p:txBody>
-      </p:sp>
-      <p:sp>
-        <p:nvSpPr>
-          <p:cNvPr id="3" name="Título 1">
-            <a:extLst>
-              <a:ext uri="{FF2B5EF4-FFF2-40B4-BE49-F238E27FC236}">
-                <a16:creationId xmlns:a16="http://schemas.microsoft.com/office/drawing/2014/main" id="{7C120193-6849-CE6D-6EBA-B24862DD107E}"/>
-              </a:ext>
-            </a:extLst>
-          </p:cNvPr>
-          <p:cNvSpPr txBox="1">
-            <a:spLocks/>
-          </p:cNvSpPr>
-          <p:nvPr/>
-        </p:nvSpPr>
-        <p:spPr>
-          <a:xfrm>
-            <a:off x="904662" y="3781071"/>
-            <a:ext cx="8949267" cy="2193269"/>
-          </a:xfrm>
-          <a:prstGeom prst="rect">
-            <a:avLst/>
-          </a:prstGeom>
-        </p:spPr>
-        <p:txBody>
-          <a:bodyPr vert="horz" lIns="91440" tIns="45720" rIns="91440" bIns="45720" rtlCol="0" anchor="b">
-            <a:noAutofit/>
-          </a:bodyPr>
-          <a:lstStyle>
-            <a:lvl1pPr algn="l" defTabSz="914400" rtl="0" eaLnBrk="1" latinLnBrk="0" hangingPunct="1">
-              <a:lnSpc>
-                <a:spcPct val="90000"/>
-              </a:lnSpc>
-              <a:spcBef>
-                <a:spcPct val="0"/>
-              </a:spcBef>
-              <a:buNone/>
-              <a:defRPr sz="4400" kern="1200">
-                <a:solidFill>
-                  <a:schemeClr val="tx1"/>
-                </a:solidFill>
-                <a:latin typeface="+mj-lt"/>
-                <a:ea typeface="+mj-ea"/>
-                <a:cs typeface="+mj-cs"/>
-              </a:defRPr>
-            </a:lvl1pPr>
-          </a:lstStyle>
-          <a:p>
-            <a:r>
-              <a:rPr lang="es-EC" sz="4800" dirty="0">
-                <a:ln w="22225">
-                  <a:solidFill>
-                    <a:schemeClr val="tx1"/>
-                  </a:solidFill>
-                  <a:miter lim="800000"/>
-                </a:ln>
-                <a:noFill/>
-              </a:rPr>
-              <a:t>Dominio</a:t>
-            </a:r>
-            <a:r>
-              <a:rPr lang="en-US" sz="4800" dirty="0">
-                <a:ln w="22225">
-                  <a:solidFill>
-                    <a:schemeClr val="tx1"/>
-                  </a:solidFill>
-                  <a:miter lim="800000"/>
-                </a:ln>
-                <a:noFill/>
-              </a:rPr>
-              <a:t> = 50$</a:t>
-            </a:r>
-          </a:p>
-          <a:p>
-            <a:r>
-              <a:rPr lang="en-US" sz="4800" dirty="0">
-                <a:ln w="22225">
-                  <a:solidFill>
-                    <a:schemeClr val="tx1"/>
-                  </a:solidFill>
-                  <a:miter lim="800000"/>
-                </a:ln>
-                <a:noFill/>
-              </a:rPr>
-              <a:t>Host 98$ </a:t>
-            </a:r>
-            <a:r>
-              <a:rPr lang="es-EC" sz="4800" dirty="0">
-                <a:ln w="22225">
-                  <a:solidFill>
-                    <a:schemeClr val="tx1"/>
-                  </a:solidFill>
-                  <a:miter lim="800000"/>
-                </a:ln>
-                <a:noFill/>
-              </a:rPr>
-              <a:t>anual</a:t>
-            </a:r>
-          </a:p>
-        </p:txBody>
-      </p:sp>
-    </p:spTree>
-    <p:extLst>
-      <p:ext uri="{BB962C8B-B14F-4D97-AF65-F5344CB8AC3E}">
-        <p14:creationId xmlns:p14="http://schemas.microsoft.com/office/powerpoint/2010/main" val="4019283585"/>
-      </p:ext>
-    </p:extLst>
-  </p:cSld>
-  <p:clrMapOvr>
-    <a:overrideClrMapping bg1="dk1" tx1="lt1" bg2="dk2" tx2="lt2" accent1="accent1" accent2="accent2" accent3="accent3" accent4="accent4" accent5="accent5" accent6="accent6" hlink="hlink" folHlink="folHlink"/>
-  </p:clrMapOvr>
-  <p:timing>
-    <p:tnLst>
-      <p:par>
-        <p:cTn id="1" dur="indefinite" restart="never" nodeType="tmRoot">
-          <p:childTnLst>
-            <p:seq concurrent="1" nextAc="seek">
-              <p:cTn id="2" dur="indefinite" nodeType="mainSeq">
-                <p:childTnLst>
-                  <p:par>
-                    <p:cTn id="3" fill="hold">
-                      <p:stCondLst>
-                        <p:cond delay="indefinite"/>
-                        <p:cond evt="onBegin" delay="0">
-                          <p:tn val="2"/>
-                        </p:cond>
-                      </p:stCondLst>
-                      <p:childTnLst>
-                        <p:par>
-                          <p:cTn id="4" fill="hold">
-                            <p:stCondLst>
-                              <p:cond delay="0"/>
-                            </p:stCondLst>
-                            <p:childTnLst>
-                              <p:par>
-                                <p:cTn id="5" presetID="10" presetClass="entr" presetSubtype="0" fill="hold" grpId="0" nodeType="withEffect">
-                                  <p:stCondLst>
-                                    <p:cond delay="1000"/>
-                                  </p:stCondLst>
-                                  <p:iterate type="lt">
-                                    <p:tmPct val="10000"/>
-                                  </p:iterate>
-                                  <p:childTnLst>
-                                    <p:set>
-                                      <p:cBhvr>
-                                        <p:cTn id="6" dur="1" fill="hold">
-                                          <p:stCondLst>
-                                            <p:cond delay="0"/>
-                                          </p:stCondLst>
-                                        </p:cTn>
-                                        <p:tgtEl>
-                                          <p:spTgt spid="2"/>
-                                        </p:tgtEl>
-                                        <p:attrNameLst>
-                                          <p:attrName>style.visibility</p:attrName>
-                                        </p:attrNameLst>
-                                      </p:cBhvr>
-                                      <p:to>
-                                        <p:strVal val="visible"/>
-                                      </p:to>
-                                    </p:set>
-                                    <p:animEffect transition="in" filter="fade">
-                                      <p:cBhvr>
-                                        <p:cTn id="7" dur="400"/>
-                                        <p:tgtEl>
-                                          <p:spTgt spid="2"/>
-                                        </p:tgtEl>
-                                      </p:cBhvr>
-                                    </p:animEffect>
-                                  </p:childTnLst>
-                                </p:cTn>
-                              </p:par>
-                              <p:par>
-                                <p:cTn id="8" presetID="10" presetClass="entr" presetSubtype="0" fill="hold" grpId="0" nodeType="withEffect">
-                                  <p:stCondLst>
-                                    <p:cond delay="1000"/>
-                                  </p:stCondLst>
-                                  <p:iterate type="lt">
-                                    <p:tmPct val="10000"/>
-                                  </p:iterate>
-                                  <p:childTnLst>
-                                    <p:set>
-                                      <p:cBhvr>
-                                        <p:cTn id="9" dur="1" fill="hold">
-                                          <p:stCondLst>
-                                            <p:cond delay="0"/>
-                                          </p:stCondLst>
-                                        </p:cTn>
-                                        <p:tgtEl>
-                                          <p:spTgt spid="3"/>
-                                        </p:tgtEl>
-                                        <p:attrNameLst>
-                                          <p:attrName>style.visibility</p:attrName>
-                                        </p:attrNameLst>
-                                      </p:cBhvr>
-                                      <p:to>
-                                        <p:strVal val="visible"/>
-                                      </p:to>
-                                    </p:set>
-                                    <p:animEffect transition="in" filter="fade">
-                                      <p:cBhvr>
-                                        <p:cTn id="10" dur="400"/>
-                                        <p:tgtEl>
-                                          <p:spTgt spid="3"/>
-                                        </p:tgtEl>
-                                      </p:cBhvr>
-                                    </p:animEffect>
-                                  </p:childTnLst>
-                                </p:cTn>
-                              </p:par>
-                            </p:childTnLst>
-                          </p:cTn>
-                        </p:par>
-                      </p:childTnLst>
-                    </p:cTn>
-                  </p:par>
-                </p:childTnLst>
-              </p:cTn>
-              <p:prevCondLst>
-                <p:cond evt="onPrev" delay="0">
-                  <p:tgtEl>
-                    <p:sldTgt/>
-                  </p:tgtEl>
-                </p:cond>
-              </p:prevCondLst>
-              <p:nextCondLst>
-                <p:cond evt="onNext" delay="0">
-                  <p:tgtEl>
-                    <p:sldTgt/>
-                  </p:tgtEl>
-                </p:cond>
-              </p:nextCondLst>
-            </p:seq>
-          </p:childTnLst>
-        </p:cTn>
-      </p:par>
-    </p:tnLst>
-    <p:bldLst>
-      <p:bldP spid="2" grpId="0"/>
-      <p:bldP spid="3" grpId="0"/>
-    </p:bldLst>
-  </p:timing>
-</p:sld>
-</file>
-
-<file path=ppt/slides/slide12.xml><?xml version="1.0" encoding="utf-8"?>
-<p:sld xmlns:a="http://schemas.openxmlformats.org/drawingml/2006/main" xmlns:r="http://schemas.openxmlformats.org/officeDocument/2006/relationships" xmlns:p="http://schemas.openxmlformats.org/presentationml/2006/main">
-  <p:cSld>
-    <p:bg>
-      <p:bgPr>
-        <a:solidFill>
-          <a:schemeClr val="bg1"/>
-        </a:solidFill>
-        <a:effectLst/>
-      </p:bgPr>
-    </p:bg>
-    <p:spTree>
-      <p:nvGrpSpPr>
-        <p:cNvPr id="1" name=""/>
-        <p:cNvGrpSpPr/>
-        <p:nvPr/>
-      </p:nvGrpSpPr>
-      <p:grpSpPr>
-        <a:xfrm>
-          <a:off x="0" y="0"/>
-          <a:ext cx="0" cy="0"/>
-          <a:chOff x="0" y="0"/>
-          <a:chExt cx="0" cy="0"/>
-        </a:xfrm>
-      </p:grpSpPr>
-      <p:sp>
-        <p:nvSpPr>
-          <p:cNvPr id="9" name="Rectangle 8">
-            <a:extLst>
-              <a:ext uri="{FF2B5EF4-FFF2-40B4-BE49-F238E27FC236}">
-                <a16:creationId xmlns:a16="http://schemas.microsoft.com/office/drawing/2014/main" id="{AE2B703B-46F9-481A-A605-82E2A828C4FA}"/>
-              </a:ext>
-              <a:ext uri="{C183D7F6-B498-43B3-948B-1728B52AA6E4}">
-                <adec:decorative xmlns:adec="http://schemas.microsoft.com/office/drawing/2017/decorative" val="1"/>
-              </a:ext>
-            </a:extLst>
-          </p:cNvPr>
-          <p:cNvSpPr>
-            <a:spLocks noGrp="1" noRot="1" noChangeAspect="1" noMove="1" noResize="1" noEditPoints="1" noAdjustHandles="1" noChangeArrowheads="1" noChangeShapeType="1" noTextEdit="1"/>
-          </p:cNvSpPr>
-          <p:nvPr>
-            <p:extLst>
-              <p:ext uri="{386F3935-93C4-4BCD-93E2-E3B085C9AB24}">
-                <p16:designElem xmlns:p16="http://schemas.microsoft.com/office/powerpoint/2015/main" val="1"/>
-              </p:ext>
-            </p:extLst>
-          </p:nvPr>
-        </p:nvSpPr>
-        <p:spPr>
-          <a:xfrm>
-            <a:off x="0" y="0"/>
-            <a:ext cx="12192000" cy="6858000"/>
-          </a:xfrm>
-          <a:prstGeom prst="rect">
-            <a:avLst/>
-          </a:prstGeom>
-          <a:solidFill>
-            <a:schemeClr val="accent2"/>
-          </a:solidFill>
-          <a:ln>
-            <a:noFill/>
-          </a:ln>
-        </p:spPr>
-        <p:style>
-          <a:lnRef idx="2">
-            <a:schemeClr val="accent1">
-              <a:shade val="50000"/>
-            </a:schemeClr>
-          </a:lnRef>
-          <a:fillRef idx="1">
-            <a:schemeClr val="accent1"/>
-          </a:fillRef>
-          <a:effectRef idx="0">
-            <a:schemeClr val="accent1"/>
-          </a:effectRef>
-          <a:fontRef idx="minor">
-            <a:schemeClr val="lt1"/>
-          </a:fontRef>
-        </p:style>
-        <p:txBody>
-          <a:bodyPr rtlCol="0" anchor="ctr"/>
-          <a:lstStyle/>
-          <a:p>
-            <a:pPr algn="ctr"/>
-            <a:endParaRPr lang="en-US"/>
-          </a:p>
-        </p:txBody>
-      </p:sp>
-      <p:sp>
-        <p:nvSpPr>
-          <p:cNvPr id="2" name="Título 1">
-            <a:extLst>
-              <a:ext uri="{FF2B5EF4-FFF2-40B4-BE49-F238E27FC236}">
-                <a16:creationId xmlns:a16="http://schemas.microsoft.com/office/drawing/2014/main" id="{4FB3385D-57A9-8597-196E-1ED708F7FCF5}"/>
-              </a:ext>
-            </a:extLst>
-          </p:cNvPr>
-          <p:cNvSpPr>
-            <a:spLocks noGrp="1"/>
-          </p:cNvSpPr>
-          <p:nvPr>
-            <p:ph type="title"/>
-          </p:nvPr>
-        </p:nvSpPr>
-        <p:spPr>
-          <a:xfrm>
-            <a:off x="838200" y="459863"/>
-            <a:ext cx="10515600" cy="1004594"/>
-          </a:xfrm>
-        </p:spPr>
-        <p:txBody>
-          <a:bodyPr>
-            <a:normAutofit/>
-          </a:bodyPr>
-          <a:lstStyle/>
-          <a:p>
-            <a:pPr algn="ctr"/>
-            <a:r>
-              <a:rPr lang="es-ES">
-                <a:solidFill>
-                  <a:srgbClr val="FFFFFF"/>
-                </a:solidFill>
-              </a:rPr>
-              <a:t>LECCIONES APRENDIDAS</a:t>
-            </a:r>
-          </a:p>
-        </p:txBody>
-      </p:sp>
-      <p:sp>
-        <p:nvSpPr>
-          <p:cNvPr id="11" name="Rectangle: Rounded Corners 10">
-            <a:extLst>
-              <a:ext uri="{FF2B5EF4-FFF2-40B4-BE49-F238E27FC236}">
-                <a16:creationId xmlns:a16="http://schemas.microsoft.com/office/drawing/2014/main" id="{F13BE4D7-0C3D-4906-B230-A1C5B4665CCF}"/>
-              </a:ext>
-              <a:ext uri="{C183D7F6-B498-43B3-948B-1728B52AA6E4}">
-                <adec:decorative xmlns:adec="http://schemas.microsoft.com/office/drawing/2017/decorative" val="1"/>
-              </a:ext>
-            </a:extLst>
-          </p:cNvPr>
-          <p:cNvSpPr>
-            <a:spLocks noGrp="1" noRot="1" noChangeAspect="1" noMove="1" noResize="1" noEditPoints="1" noAdjustHandles="1" noChangeArrowheads="1" noChangeShapeType="1" noTextEdit="1"/>
-          </p:cNvSpPr>
-          <p:nvPr>
-            <p:extLst>
-              <p:ext uri="{386F3935-93C4-4BCD-93E2-E3B085C9AB24}">
-                <p16:designElem xmlns:p16="http://schemas.microsoft.com/office/powerpoint/2015/main" val="1"/>
-              </p:ext>
-            </p:extLst>
-          </p:nvPr>
-        </p:nvSpPr>
-        <p:spPr>
-          <a:xfrm>
-            <a:off x="579496" y="1587970"/>
-            <a:ext cx="11033008" cy="4768380"/>
-          </a:xfrm>
-          <a:prstGeom prst="roundRect">
-            <a:avLst>
-              <a:gd name="adj" fmla="val 3174"/>
-            </a:avLst>
-          </a:prstGeom>
-          <a:solidFill>
-            <a:schemeClr val="bg1">
-              <a:alpha val="95000"/>
-            </a:schemeClr>
-          </a:solidFill>
-          <a:ln>
-            <a:noFill/>
-          </a:ln>
-        </p:spPr>
-        <p:style>
-          <a:lnRef idx="2">
-            <a:schemeClr val="accent1">
-              <a:shade val="50000"/>
-            </a:schemeClr>
-          </a:lnRef>
-          <a:fillRef idx="1">
-            <a:schemeClr val="accent1"/>
-          </a:fillRef>
-          <a:effectRef idx="0">
-            <a:schemeClr val="accent1"/>
-          </a:effectRef>
-          <a:fontRef idx="minor">
-            <a:schemeClr val="lt1"/>
-          </a:fontRef>
-        </p:style>
-        <p:txBody>
-          <a:bodyPr rtlCol="0" anchor="ctr"/>
-          <a:lstStyle/>
-          <a:p>
-            <a:pPr algn="ctr"/>
-            <a:endParaRPr lang="en-US"/>
-          </a:p>
-        </p:txBody>
-      </p:sp>
-      <p:graphicFrame>
-        <p:nvGraphicFramePr>
-          <p:cNvPr id="5" name="Marcador de contenido 2">
-            <a:extLst>
-              <a:ext uri="{FF2B5EF4-FFF2-40B4-BE49-F238E27FC236}">
-                <a16:creationId xmlns:a16="http://schemas.microsoft.com/office/drawing/2014/main" id="{5D37F95D-62BC-882D-822A-6129930F8CE7}"/>
-              </a:ext>
-            </a:extLst>
-          </p:cNvPr>
-          <p:cNvGraphicFramePr>
-            <a:graphicFrameLocks noGrp="1"/>
-          </p:cNvGraphicFramePr>
-          <p:nvPr>
-            <p:ph idx="1"/>
-            <p:extLst>
-              <p:ext uri="{D42A27DB-BD31-4B8C-83A1-F6EECF244321}">
-                <p14:modId xmlns:p14="http://schemas.microsoft.com/office/powerpoint/2010/main" val="2186778652"/>
-              </p:ext>
-            </p:extLst>
-          </p:nvPr>
-        </p:nvGraphicFramePr>
-        <p:xfrm>
-          <a:off x="838200" y="1800911"/>
-          <a:ext cx="10515600" cy="4351338"/>
-        </p:xfrm>
-        <a:graphic>
-          <a:graphicData uri="http://schemas.openxmlformats.org/drawingml/2006/diagram">
-            <dgm:relIds xmlns:dgm="http://schemas.openxmlformats.org/drawingml/2006/diagram" xmlns:r="http://schemas.openxmlformats.org/officeDocument/2006/relationships" r:dm="rId2" r:lo="rId3" r:qs="rId4" r:cs="rId5"/>
-          </a:graphicData>
-        </a:graphic>
-      </p:graphicFrame>
-    </p:spTree>
-    <p:extLst>
-      <p:ext uri="{BB962C8B-B14F-4D97-AF65-F5344CB8AC3E}">
-        <p14:creationId xmlns:p14="http://schemas.microsoft.com/office/powerpoint/2010/main" val="3890509919"/>
-      </p:ext>
-    </p:extLst>
-  </p:cSld>
-  <p:clrMapOvr>
-    <a:masterClrMapping/>
-  </p:clrMapOvr>
-</p:sld>
-</file>
-
-<file path=ppt/slides/slide13.xml><?xml version="1.0" encoding="utf-8"?>
-<p:sld xmlns:a="http://schemas.openxmlformats.org/drawingml/2006/main" xmlns:r="http://schemas.openxmlformats.org/officeDocument/2006/relationships" xmlns:p="http://schemas.openxmlformats.org/presentationml/2006/main">
-  <p:cSld>
-    <p:bg>
-      <p:bgPr>
-        <a:solidFill>
-          <a:schemeClr val="bg1"/>
-        </a:solidFill>
-        <a:effectLst/>
-      </p:bgPr>
-    </p:bg>
-    <p:spTree>
-      <p:nvGrpSpPr>
-        <p:cNvPr id="1" name=""/>
-        <p:cNvGrpSpPr/>
-        <p:nvPr/>
-      </p:nvGrpSpPr>
-      <p:grpSpPr>
-        <a:xfrm>
-          <a:off x="0" y="0"/>
-          <a:ext cx="0" cy="0"/>
-          <a:chOff x="0" y="0"/>
-          <a:chExt cx="0" cy="0"/>
-        </a:xfrm>
-      </p:grpSpPr>
       <p:sp>
         <p:nvSpPr>
           <p:cNvPr id="17" name="Rectangle 16">
@@ -10199,7 +9278,7 @@
 </p:sld>
 </file>
 
-<file path=ppt/slides/slide14.xml><?xml version="1.0" encoding="utf-8"?>
+<file path=ppt/slides/slide11.xml><?xml version="1.0" encoding="utf-8"?>
 <p:sld xmlns:a="http://schemas.openxmlformats.org/drawingml/2006/main" xmlns:r="http://schemas.openxmlformats.org/officeDocument/2006/relationships" xmlns:p="http://schemas.openxmlformats.org/presentationml/2006/main">
   <p:cSld>
     <p:bg>
@@ -13229,2209 +12308,6 @@
 </file>
 
 <file path=ppt/slides/slide2.xml><?xml version="1.0" encoding="utf-8"?>
-<p:sld xmlns:a="http://schemas.openxmlformats.org/drawingml/2006/main" xmlns:r="http://schemas.openxmlformats.org/officeDocument/2006/relationships" xmlns:p="http://schemas.openxmlformats.org/presentationml/2006/main">
-  <p:cSld>
-    <p:bg>
-      <p:bgPr>
-        <a:solidFill>
-          <a:schemeClr val="bg1"/>
-        </a:solidFill>
-        <a:effectLst/>
-      </p:bgPr>
-    </p:bg>
-    <p:spTree>
-      <p:nvGrpSpPr>
-        <p:cNvPr id="1" name=""/>
-        <p:cNvGrpSpPr/>
-        <p:nvPr/>
-      </p:nvGrpSpPr>
-      <p:grpSpPr>
-        <a:xfrm>
-          <a:off x="0" y="0"/>
-          <a:ext cx="0" cy="0"/>
-          <a:chOff x="0" y="0"/>
-          <a:chExt cx="0" cy="0"/>
-        </a:xfrm>
-      </p:grpSpPr>
-      <p:pic>
-        <p:nvPicPr>
-          <p:cNvPr id="5122" name="Picture 2">
-            <a:extLst>
-              <a:ext uri="{FF2B5EF4-FFF2-40B4-BE49-F238E27FC236}">
-                <a16:creationId xmlns:a16="http://schemas.microsoft.com/office/drawing/2014/main" id="{95275804-447F-45D7-A6AB-D5BC8B4F3358}"/>
-              </a:ext>
-            </a:extLst>
-          </p:cNvPr>
-          <p:cNvPicPr>
-            <a:picLocks noChangeAspect="1" noChangeArrowheads="1"/>
-          </p:cNvPicPr>
-          <p:nvPr/>
-        </p:nvPicPr>
-        <p:blipFill>
-          <a:blip r:embed="rId2">
-            <a:extLst>
-              <a:ext uri="{28A0092B-C50C-407E-A947-70E740481C1C}">
-                <a14:useLocalDpi xmlns:a14="http://schemas.microsoft.com/office/drawing/2010/main" val="0"/>
-              </a:ext>
-            </a:extLst>
-          </a:blip>
-          <a:srcRect t="11461" b="11461"/>
-          <a:stretch/>
-        </p:blipFill>
-        <p:spPr bwMode="auto">
-          <a:xfrm>
-            <a:off x="-295837" y="0"/>
-            <a:ext cx="13865391" cy="7799284"/>
-          </a:xfrm>
-          <a:prstGeom prst="rect">
-            <a:avLst/>
-          </a:prstGeom>
-          <a:noFill/>
-          <a:extLst>
-            <a:ext uri="{909E8E84-426E-40DD-AFC4-6F175D3DCCD1}">
-              <a14:hiddenFill xmlns:a14="http://schemas.microsoft.com/office/drawing/2010/main">
-                <a:solidFill>
-                  <a:srgbClr val="FFFFFF"/>
-                </a:solidFill>
-              </a14:hiddenFill>
-            </a:ext>
-          </a:extLst>
-        </p:spPr>
-      </p:pic>
-      <p:sp>
-        <p:nvSpPr>
-          <p:cNvPr id="2" name="Título 1">
-            <a:extLst>
-              <a:ext uri="{FF2B5EF4-FFF2-40B4-BE49-F238E27FC236}">
-                <a16:creationId xmlns:a16="http://schemas.microsoft.com/office/drawing/2014/main" id="{1B821B62-3517-478E-A60E-C478029540AB}"/>
-              </a:ext>
-            </a:extLst>
-          </p:cNvPr>
-          <p:cNvSpPr>
-            <a:spLocks noGrp="1"/>
-          </p:cNvSpPr>
-          <p:nvPr>
-            <p:ph type="title"/>
-          </p:nvPr>
-        </p:nvSpPr>
-        <p:spPr>
-          <a:xfrm>
-            <a:off x="2794858" y="1160929"/>
-            <a:ext cx="7684000" cy="2268071"/>
-          </a:xfrm>
-        </p:spPr>
-        <p:txBody>
-          <a:bodyPr vert="horz" lIns="91440" tIns="45720" rIns="91440" bIns="45720" rtlCol="0" anchor="b">
-            <a:normAutofit/>
-          </a:bodyPr>
-          <a:lstStyle/>
-          <a:p>
-            <a:pPr algn="ctr"/>
-            <a:r>
-              <a:rPr lang="es-EC" sz="11500" b="1" dirty="0">
-                <a:ln w="22225">
-                  <a:solidFill>
-                    <a:schemeClr val="tx1"/>
-                  </a:solidFill>
-                  <a:miter lim="800000"/>
-                </a:ln>
-                <a:noFill/>
-              </a:rPr>
-              <a:t>Estadísticas</a:t>
-            </a:r>
-          </a:p>
-        </p:txBody>
-      </p:sp>
-    </p:spTree>
-    <p:extLst>
-      <p:ext uri="{BB962C8B-B14F-4D97-AF65-F5344CB8AC3E}">
-        <p14:creationId xmlns:p14="http://schemas.microsoft.com/office/powerpoint/2010/main" val="2957289971"/>
-      </p:ext>
-    </p:extLst>
-  </p:cSld>
-  <p:clrMapOvr>
-    <a:overrideClrMapping bg1="dk1" tx1="lt1" bg2="dk2" tx2="lt2" accent1="accent1" accent2="accent2" accent3="accent3" accent4="accent4" accent5="accent5" accent6="accent6" hlink="hlink" folHlink="folHlink"/>
-  </p:clrMapOvr>
-  <p:timing>
-    <p:tnLst>
-      <p:par>
-        <p:cTn id="1" dur="indefinite" restart="never" nodeType="tmRoot">
-          <p:childTnLst>
-            <p:seq concurrent="1" nextAc="seek">
-              <p:cTn id="2" dur="indefinite" nodeType="mainSeq">
-                <p:childTnLst>
-                  <p:par>
-                    <p:cTn id="3" fill="hold">
-                      <p:stCondLst>
-                        <p:cond delay="indefinite"/>
-                        <p:cond evt="onBegin" delay="0">
-                          <p:tn val="2"/>
-                        </p:cond>
-                      </p:stCondLst>
-                      <p:childTnLst>
-                        <p:par>
-                          <p:cTn id="4" fill="hold">
-                            <p:stCondLst>
-                              <p:cond delay="0"/>
-                            </p:stCondLst>
-                            <p:childTnLst>
-                              <p:par>
-                                <p:cTn id="5" presetID="10" presetClass="entr" presetSubtype="0" fill="hold" grpId="0" nodeType="withEffect">
-                                  <p:stCondLst>
-                                    <p:cond delay="1000"/>
-                                  </p:stCondLst>
-                                  <p:iterate type="lt">
-                                    <p:tmPct val="10000"/>
-                                  </p:iterate>
-                                  <p:childTnLst>
-                                    <p:set>
-                                      <p:cBhvr>
-                                        <p:cTn id="6" dur="1" fill="hold">
-                                          <p:stCondLst>
-                                            <p:cond delay="0"/>
-                                          </p:stCondLst>
-                                        </p:cTn>
-                                        <p:tgtEl>
-                                          <p:spTgt spid="2"/>
-                                        </p:tgtEl>
-                                        <p:attrNameLst>
-                                          <p:attrName>style.visibility</p:attrName>
-                                        </p:attrNameLst>
-                                      </p:cBhvr>
-                                      <p:to>
-                                        <p:strVal val="visible"/>
-                                      </p:to>
-                                    </p:set>
-                                    <p:animEffect transition="in" filter="fade">
-                                      <p:cBhvr>
-                                        <p:cTn id="7" dur="400"/>
-                                        <p:tgtEl>
-                                          <p:spTgt spid="2"/>
-                                        </p:tgtEl>
-                                      </p:cBhvr>
-                                    </p:animEffect>
-                                  </p:childTnLst>
-                                </p:cTn>
-                              </p:par>
-                            </p:childTnLst>
-                          </p:cTn>
-                        </p:par>
-                      </p:childTnLst>
-                    </p:cTn>
-                  </p:par>
-                </p:childTnLst>
-              </p:cTn>
-              <p:prevCondLst>
-                <p:cond evt="onPrev" delay="0">
-                  <p:tgtEl>
-                    <p:sldTgt/>
-                  </p:tgtEl>
-                </p:cond>
-              </p:prevCondLst>
-              <p:nextCondLst>
-                <p:cond evt="onNext" delay="0">
-                  <p:tgtEl>
-                    <p:sldTgt/>
-                  </p:tgtEl>
-                </p:cond>
-              </p:nextCondLst>
-            </p:seq>
-          </p:childTnLst>
-        </p:cTn>
-      </p:par>
-    </p:tnLst>
-    <p:bldLst>
-      <p:bldP spid="2" grpId="0"/>
-    </p:bldLst>
-  </p:timing>
-</p:sld>
-</file>
-
-<file path=ppt/slides/slide3.xml><?xml version="1.0" encoding="utf-8"?>
-<p:sld xmlns:a="http://schemas.openxmlformats.org/drawingml/2006/main" xmlns:r="http://schemas.openxmlformats.org/officeDocument/2006/relationships" xmlns:p="http://schemas.openxmlformats.org/presentationml/2006/main">
-  <p:cSld>
-    <p:bg>
-      <p:bgPr>
-        <a:solidFill>
-          <a:schemeClr val="bg1"/>
-        </a:solidFill>
-        <a:effectLst/>
-      </p:bgPr>
-    </p:bg>
-    <p:spTree>
-      <p:nvGrpSpPr>
-        <p:cNvPr id="1" name=""/>
-        <p:cNvGrpSpPr/>
-        <p:nvPr/>
-      </p:nvGrpSpPr>
-      <p:grpSpPr>
-        <a:xfrm>
-          <a:off x="0" y="0"/>
-          <a:ext cx="0" cy="0"/>
-          <a:chOff x="0" y="0"/>
-          <a:chExt cx="0" cy="0"/>
-        </a:xfrm>
-      </p:grpSpPr>
-      <p:sp useBgFill="1">
-        <p:nvSpPr>
-          <p:cNvPr id="36" name="Rectangle 30">
-            <a:extLst>
-              <a:ext uri="{FF2B5EF4-FFF2-40B4-BE49-F238E27FC236}">
-                <a16:creationId xmlns:a16="http://schemas.microsoft.com/office/drawing/2014/main" id="{C4E4288A-DFC8-40A2-90E5-70E851A933AD}"/>
-              </a:ext>
-              <a:ext uri="{C183D7F6-B498-43B3-948B-1728B52AA6E4}">
-                <adec:decorative xmlns:adec="http://schemas.microsoft.com/office/drawing/2017/decorative" val="1"/>
-              </a:ext>
-            </a:extLst>
-          </p:cNvPr>
-          <p:cNvSpPr>
-            <a:spLocks noGrp="1" noRot="1" noChangeAspect="1" noMove="1" noResize="1" noEditPoints="1" noAdjustHandles="1" noChangeArrowheads="1" noChangeShapeType="1" noTextEdit="1"/>
-          </p:cNvSpPr>
-          <p:nvPr>
-            <p:extLst>
-              <p:ext uri="{386F3935-93C4-4BCD-93E2-E3B085C9AB24}">
-                <p16:designElem xmlns:p16="http://schemas.microsoft.com/office/powerpoint/2015/main" val="1"/>
-              </p:ext>
-            </p:extLst>
-          </p:nvPr>
-        </p:nvSpPr>
-        <p:spPr>
-          <a:xfrm>
-            <a:off x="0" y="0"/>
-            <a:ext cx="12192000" cy="6858000"/>
-          </a:xfrm>
-          <a:prstGeom prst="rect">
-            <a:avLst/>
-          </a:prstGeom>
-          <a:ln>
-            <a:noFill/>
-          </a:ln>
-        </p:spPr>
-        <p:style>
-          <a:lnRef idx="2">
-            <a:schemeClr val="accent1">
-              <a:shade val="50000"/>
-            </a:schemeClr>
-          </a:lnRef>
-          <a:fillRef idx="1">
-            <a:schemeClr val="accent1"/>
-          </a:fillRef>
-          <a:effectRef idx="0">
-            <a:schemeClr val="accent1"/>
-          </a:effectRef>
-          <a:fontRef idx="minor">
-            <a:schemeClr val="lt1"/>
-          </a:fontRef>
-        </p:style>
-        <p:txBody>
-          <a:bodyPr rtlCol="0" anchor="ctr"/>
-          <a:lstStyle/>
-          <a:p>
-            <a:pPr algn="ctr"/>
-            <a:endParaRPr lang="en-US"/>
-          </a:p>
-        </p:txBody>
-      </p:sp>
-      <p:grpSp>
-        <p:nvGrpSpPr>
-          <p:cNvPr id="38" name="Group 32">
-            <a:extLst>
-              <a:ext uri="{FF2B5EF4-FFF2-40B4-BE49-F238E27FC236}">
-                <a16:creationId xmlns:a16="http://schemas.microsoft.com/office/drawing/2014/main" id="{B63C2D82-D4FA-4A37-BB01-1E7B21E4FF20}"/>
-              </a:ext>
-              <a:ext uri="{C183D7F6-B498-43B3-948B-1728B52AA6E4}">
-                <adec:decorative xmlns:adec="http://schemas.microsoft.com/office/drawing/2017/decorative" val="1"/>
-              </a:ext>
-            </a:extLst>
-          </p:cNvPr>
-          <p:cNvGrpSpPr>
-            <a:grpSpLocks noGrp="1" noUngrp="1" noRot="1" noChangeAspect="1" noMove="1" noResize="1"/>
-          </p:cNvGrpSpPr>
-          <p:nvPr>
-            <p:extLst>
-              <p:ext uri="{386F3935-93C4-4BCD-93E2-E3B085C9AB24}">
-                <p16:designElem xmlns:p16="http://schemas.microsoft.com/office/powerpoint/2015/main" val="1"/>
-              </p:ext>
-            </p:extLst>
-          </p:nvPr>
-        </p:nvGrpSpPr>
-        <p:grpSpPr>
-          <a:xfrm>
-            <a:off x="965199" y="634058"/>
-            <a:ext cx="1128382" cy="847206"/>
-            <a:chOff x="5307830" y="325570"/>
-            <a:chExt cx="1128382" cy="847206"/>
-          </a:xfrm>
-        </p:grpSpPr>
-        <p:sp>
-          <p:nvSpPr>
-            <p:cNvPr id="34" name="Freeform 5">
-              <a:extLst>
-                <a:ext uri="{FF2B5EF4-FFF2-40B4-BE49-F238E27FC236}">
-                  <a16:creationId xmlns:a16="http://schemas.microsoft.com/office/drawing/2014/main" id="{C94E7FEF-0CE9-4AC2-94BB-02230C6DC0DF}"/>
-                </a:ext>
-                <a:ext uri="{C183D7F6-B498-43B3-948B-1728B52AA6E4}">
-                  <adec:decorative xmlns:adec="http://schemas.microsoft.com/office/drawing/2017/decorative" val="1"/>
-                </a:ext>
-              </a:extLst>
-            </p:cNvPr>
-            <p:cNvSpPr>
-              <a:spLocks/>
-            </p:cNvSpPr>
-            <p:nvPr>
-              <p:extLst>
-                <p:ext uri="{386F3935-93C4-4BCD-93E2-E3B085C9AB24}">
-                  <p16:designElem xmlns:p16="http://schemas.microsoft.com/office/powerpoint/2015/main" val="1"/>
-                </p:ext>
-              </p:extLst>
-            </p:nvPr>
-          </p:nvSpPr>
-          <p:spPr bwMode="auto">
-            <a:xfrm>
-              <a:off x="5307830" y="577396"/>
-              <a:ext cx="675351" cy="595380"/>
-            </a:xfrm>
-            <a:custGeom>
-              <a:avLst/>
-              <a:gdLst>
-                <a:gd name="T0" fmla="*/ 225 w 785"/>
-                <a:gd name="T1" fmla="*/ 692 h 692"/>
-                <a:gd name="T2" fmla="*/ 177 w 785"/>
-                <a:gd name="T3" fmla="*/ 665 h 692"/>
-                <a:gd name="T4" fmla="*/ 9 w 785"/>
-                <a:gd name="T5" fmla="*/ 374 h 692"/>
-                <a:gd name="T6" fmla="*/ 9 w 785"/>
-                <a:gd name="T7" fmla="*/ 318 h 692"/>
-                <a:gd name="T8" fmla="*/ 177 w 785"/>
-                <a:gd name="T9" fmla="*/ 27 h 692"/>
-                <a:gd name="T10" fmla="*/ 225 w 785"/>
-                <a:gd name="T11" fmla="*/ 0 h 692"/>
-                <a:gd name="T12" fmla="*/ 561 w 785"/>
-                <a:gd name="T13" fmla="*/ 0 h 692"/>
-                <a:gd name="T14" fmla="*/ 609 w 785"/>
-                <a:gd name="T15" fmla="*/ 27 h 692"/>
-                <a:gd name="T16" fmla="*/ 777 w 785"/>
-                <a:gd name="T17" fmla="*/ 318 h 692"/>
-                <a:gd name="T18" fmla="*/ 777 w 785"/>
-                <a:gd name="T19" fmla="*/ 374 h 692"/>
-                <a:gd name="T20" fmla="*/ 609 w 785"/>
-                <a:gd name="T21" fmla="*/ 665 h 692"/>
-                <a:gd name="T22" fmla="*/ 561 w 785"/>
-                <a:gd name="T23" fmla="*/ 692 h 692"/>
-                <a:gd name="T24" fmla="*/ 225 w 785"/>
-                <a:gd name="T25" fmla="*/ 692 h 692"/>
-              </a:gdLst>
-              <a:ahLst/>
-              <a:cxnLst>
-                <a:cxn ang="0">
-                  <a:pos x="T0" y="T1"/>
-                </a:cxn>
-                <a:cxn ang="0">
-                  <a:pos x="T2" y="T3"/>
-                </a:cxn>
-                <a:cxn ang="0">
-                  <a:pos x="T4" y="T5"/>
-                </a:cxn>
-                <a:cxn ang="0">
-                  <a:pos x="T6" y="T7"/>
-                </a:cxn>
-                <a:cxn ang="0">
-                  <a:pos x="T8" y="T9"/>
-                </a:cxn>
-                <a:cxn ang="0">
-                  <a:pos x="T10" y="T11"/>
-                </a:cxn>
-                <a:cxn ang="0">
-                  <a:pos x="T12" y="T13"/>
-                </a:cxn>
-                <a:cxn ang="0">
-                  <a:pos x="T14" y="T15"/>
-                </a:cxn>
-                <a:cxn ang="0">
-                  <a:pos x="T16" y="T17"/>
-                </a:cxn>
-                <a:cxn ang="0">
-                  <a:pos x="T18" y="T19"/>
-                </a:cxn>
-                <a:cxn ang="0">
-                  <a:pos x="T20" y="T21"/>
-                </a:cxn>
-                <a:cxn ang="0">
-                  <a:pos x="T22" y="T23"/>
-                </a:cxn>
-                <a:cxn ang="0">
-                  <a:pos x="T24" y="T25"/>
-                </a:cxn>
-              </a:cxnLst>
-              <a:rect l="0" t="0" r="r" b="b"/>
-              <a:pathLst>
-                <a:path w="785" h="692">
-                  <a:moveTo>
-                    <a:pt x="225" y="692"/>
-                  </a:moveTo>
-                  <a:cubicBezTo>
-                    <a:pt x="207" y="692"/>
-                    <a:pt x="185" y="680"/>
-                    <a:pt x="177" y="665"/>
-                  </a:cubicBezTo>
-                  <a:cubicBezTo>
-                    <a:pt x="9" y="374"/>
-                    <a:pt x="9" y="374"/>
-                    <a:pt x="9" y="374"/>
-                  </a:cubicBezTo>
-                  <a:cubicBezTo>
-                    <a:pt x="0" y="358"/>
-                    <a:pt x="0" y="334"/>
-                    <a:pt x="9" y="318"/>
-                  </a:cubicBezTo>
-                  <a:cubicBezTo>
-                    <a:pt x="177" y="27"/>
-                    <a:pt x="177" y="27"/>
-                    <a:pt x="177" y="27"/>
-                  </a:cubicBezTo>
-                  <a:cubicBezTo>
-                    <a:pt x="185" y="12"/>
-                    <a:pt x="207" y="0"/>
-                    <a:pt x="225" y="0"/>
-                  </a:cubicBezTo>
-                  <a:cubicBezTo>
-                    <a:pt x="561" y="0"/>
-                    <a:pt x="561" y="0"/>
-                    <a:pt x="561" y="0"/>
-                  </a:cubicBezTo>
-                  <a:cubicBezTo>
-                    <a:pt x="578" y="0"/>
-                    <a:pt x="600" y="12"/>
-                    <a:pt x="609" y="27"/>
-                  </a:cubicBezTo>
-                  <a:cubicBezTo>
-                    <a:pt x="777" y="318"/>
-                    <a:pt x="777" y="318"/>
-                    <a:pt x="777" y="318"/>
-                  </a:cubicBezTo>
-                  <a:cubicBezTo>
-                    <a:pt x="785" y="334"/>
-                    <a:pt x="785" y="358"/>
-                    <a:pt x="777" y="374"/>
-                  </a:cubicBezTo>
-                  <a:cubicBezTo>
-                    <a:pt x="609" y="665"/>
-                    <a:pt x="609" y="665"/>
-                    <a:pt x="609" y="665"/>
-                  </a:cubicBezTo>
-                  <a:cubicBezTo>
-                    <a:pt x="600" y="680"/>
-                    <a:pt x="578" y="692"/>
-                    <a:pt x="561" y="692"/>
-                  </a:cubicBezTo>
-                  <a:lnTo>
-                    <a:pt x="225" y="692"/>
-                  </a:lnTo>
-                  <a:close/>
-                </a:path>
-              </a:pathLst>
-            </a:custGeom>
-            <a:noFill/>
-            <a:ln w="28575" cmpd="sng">
-              <a:solidFill>
-                <a:schemeClr val="tx1"/>
-              </a:solidFill>
-            </a:ln>
-          </p:spPr>
-          <p:txBody>
-            <a:bodyPr vert="horz" wrap="square" lIns="91440" tIns="45720" rIns="91440" bIns="45720" numCol="1" anchor="t" anchorCtr="0" compatLnSpc="1">
-              <a:prstTxWarp prst="textNoShape">
-                <a:avLst/>
-              </a:prstTxWarp>
-            </a:bodyPr>
-            <a:lstStyle/>
-            <a:p>
-              <a:endParaRPr lang="en-US"/>
-            </a:p>
-          </p:txBody>
-        </p:sp>
-        <p:sp>
-          <p:nvSpPr>
-            <p:cNvPr id="35" name="Freeform 5">
-              <a:extLst>
-                <a:ext uri="{FF2B5EF4-FFF2-40B4-BE49-F238E27FC236}">
-                  <a16:creationId xmlns:a16="http://schemas.microsoft.com/office/drawing/2014/main" id="{EB546CC0-C1BC-48D2-8DA9-4B60283165C9}"/>
-                </a:ext>
-                <a:ext uri="{C183D7F6-B498-43B3-948B-1728B52AA6E4}">
-                  <adec:decorative xmlns:adec="http://schemas.microsoft.com/office/drawing/2017/decorative" val="1"/>
-                </a:ext>
-              </a:extLst>
-            </p:cNvPr>
-            <p:cNvSpPr>
-              <a:spLocks/>
-            </p:cNvSpPr>
-            <p:nvPr>
-              <p:extLst>
-                <p:ext uri="{386F3935-93C4-4BCD-93E2-E3B085C9AB24}">
-                  <p16:designElem xmlns:p16="http://schemas.microsoft.com/office/powerpoint/2015/main" val="1"/>
-                </p:ext>
-              </p:extLst>
-            </p:nvPr>
-          </p:nvSpPr>
-          <p:spPr bwMode="auto">
-            <a:xfrm>
-              <a:off x="5885720" y="325570"/>
-              <a:ext cx="550492" cy="485306"/>
-            </a:xfrm>
-            <a:custGeom>
-              <a:avLst/>
-              <a:gdLst>
-                <a:gd name="T0" fmla="*/ 225 w 785"/>
-                <a:gd name="T1" fmla="*/ 692 h 692"/>
-                <a:gd name="T2" fmla="*/ 177 w 785"/>
-                <a:gd name="T3" fmla="*/ 665 h 692"/>
-                <a:gd name="T4" fmla="*/ 9 w 785"/>
-                <a:gd name="T5" fmla="*/ 374 h 692"/>
-                <a:gd name="T6" fmla="*/ 9 w 785"/>
-                <a:gd name="T7" fmla="*/ 318 h 692"/>
-                <a:gd name="T8" fmla="*/ 177 w 785"/>
-                <a:gd name="T9" fmla="*/ 27 h 692"/>
-                <a:gd name="T10" fmla="*/ 225 w 785"/>
-                <a:gd name="T11" fmla="*/ 0 h 692"/>
-                <a:gd name="T12" fmla="*/ 561 w 785"/>
-                <a:gd name="T13" fmla="*/ 0 h 692"/>
-                <a:gd name="T14" fmla="*/ 609 w 785"/>
-                <a:gd name="T15" fmla="*/ 27 h 692"/>
-                <a:gd name="T16" fmla="*/ 777 w 785"/>
-                <a:gd name="T17" fmla="*/ 318 h 692"/>
-                <a:gd name="T18" fmla="*/ 777 w 785"/>
-                <a:gd name="T19" fmla="*/ 374 h 692"/>
-                <a:gd name="T20" fmla="*/ 609 w 785"/>
-                <a:gd name="T21" fmla="*/ 665 h 692"/>
-                <a:gd name="T22" fmla="*/ 561 w 785"/>
-                <a:gd name="T23" fmla="*/ 692 h 692"/>
-                <a:gd name="T24" fmla="*/ 225 w 785"/>
-                <a:gd name="T25" fmla="*/ 692 h 692"/>
-              </a:gdLst>
-              <a:ahLst/>
-              <a:cxnLst>
-                <a:cxn ang="0">
-                  <a:pos x="T0" y="T1"/>
-                </a:cxn>
-                <a:cxn ang="0">
-                  <a:pos x="T2" y="T3"/>
-                </a:cxn>
-                <a:cxn ang="0">
-                  <a:pos x="T4" y="T5"/>
-                </a:cxn>
-                <a:cxn ang="0">
-                  <a:pos x="T6" y="T7"/>
-                </a:cxn>
-                <a:cxn ang="0">
-                  <a:pos x="T8" y="T9"/>
-                </a:cxn>
-                <a:cxn ang="0">
-                  <a:pos x="T10" y="T11"/>
-                </a:cxn>
-                <a:cxn ang="0">
-                  <a:pos x="T12" y="T13"/>
-                </a:cxn>
-                <a:cxn ang="0">
-                  <a:pos x="T14" y="T15"/>
-                </a:cxn>
-                <a:cxn ang="0">
-                  <a:pos x="T16" y="T17"/>
-                </a:cxn>
-                <a:cxn ang="0">
-                  <a:pos x="T18" y="T19"/>
-                </a:cxn>
-                <a:cxn ang="0">
-                  <a:pos x="T20" y="T21"/>
-                </a:cxn>
-                <a:cxn ang="0">
-                  <a:pos x="T22" y="T23"/>
-                </a:cxn>
-                <a:cxn ang="0">
-                  <a:pos x="T24" y="T25"/>
-                </a:cxn>
-              </a:cxnLst>
-              <a:rect l="0" t="0" r="r" b="b"/>
-              <a:pathLst>
-                <a:path w="785" h="692">
-                  <a:moveTo>
-                    <a:pt x="225" y="692"/>
-                  </a:moveTo>
-                  <a:cubicBezTo>
-                    <a:pt x="207" y="692"/>
-                    <a:pt x="185" y="680"/>
-                    <a:pt x="177" y="665"/>
-                  </a:cubicBezTo>
-                  <a:cubicBezTo>
-                    <a:pt x="9" y="374"/>
-                    <a:pt x="9" y="374"/>
-                    <a:pt x="9" y="374"/>
-                  </a:cubicBezTo>
-                  <a:cubicBezTo>
-                    <a:pt x="0" y="358"/>
-                    <a:pt x="0" y="334"/>
-                    <a:pt x="9" y="318"/>
-                  </a:cubicBezTo>
-                  <a:cubicBezTo>
-                    <a:pt x="177" y="27"/>
-                    <a:pt x="177" y="27"/>
-                    <a:pt x="177" y="27"/>
-                  </a:cubicBezTo>
-                  <a:cubicBezTo>
-                    <a:pt x="185" y="12"/>
-                    <a:pt x="207" y="0"/>
-                    <a:pt x="225" y="0"/>
-                  </a:cubicBezTo>
-                  <a:cubicBezTo>
-                    <a:pt x="561" y="0"/>
-                    <a:pt x="561" y="0"/>
-                    <a:pt x="561" y="0"/>
-                  </a:cubicBezTo>
-                  <a:cubicBezTo>
-                    <a:pt x="578" y="0"/>
-                    <a:pt x="600" y="12"/>
-                    <a:pt x="609" y="27"/>
-                  </a:cubicBezTo>
-                  <a:cubicBezTo>
-                    <a:pt x="777" y="318"/>
-                    <a:pt x="777" y="318"/>
-                    <a:pt x="777" y="318"/>
-                  </a:cubicBezTo>
-                  <a:cubicBezTo>
-                    <a:pt x="785" y="334"/>
-                    <a:pt x="785" y="358"/>
-                    <a:pt x="777" y="374"/>
-                  </a:cubicBezTo>
-                  <a:cubicBezTo>
-                    <a:pt x="609" y="665"/>
-                    <a:pt x="609" y="665"/>
-                    <a:pt x="609" y="665"/>
-                  </a:cubicBezTo>
-                  <a:cubicBezTo>
-                    <a:pt x="600" y="680"/>
-                    <a:pt x="578" y="692"/>
-                    <a:pt x="561" y="692"/>
-                  </a:cubicBezTo>
-                  <a:lnTo>
-                    <a:pt x="225" y="692"/>
-                  </a:lnTo>
-                  <a:close/>
-                </a:path>
-              </a:pathLst>
-            </a:custGeom>
-            <a:noFill/>
-            <a:ln w="28575" cmpd="sng">
-              <a:solidFill>
-                <a:schemeClr val="tx1"/>
-              </a:solidFill>
-            </a:ln>
-          </p:spPr>
-          <p:txBody>
-            <a:bodyPr vert="horz" wrap="square" lIns="91440" tIns="45720" rIns="91440" bIns="45720" numCol="1" anchor="t" anchorCtr="0" compatLnSpc="1">
-              <a:prstTxWarp prst="textNoShape">
-                <a:avLst/>
-              </a:prstTxWarp>
-            </a:bodyPr>
-            <a:lstStyle/>
-            <a:p>
-              <a:endParaRPr lang="en-US"/>
-            </a:p>
-          </p:txBody>
-        </p:sp>
-      </p:grpSp>
-      <p:sp>
-        <p:nvSpPr>
-          <p:cNvPr id="37" name="Freeform 5">
-            <a:extLst>
-              <a:ext uri="{FF2B5EF4-FFF2-40B4-BE49-F238E27FC236}">
-                <a16:creationId xmlns:a16="http://schemas.microsoft.com/office/drawing/2014/main" id="{BD2BFF02-DF78-4F07-B176-52514E13127D}"/>
-              </a:ext>
-              <a:ext uri="{C183D7F6-B498-43B3-948B-1728B52AA6E4}">
-                <adec:decorative xmlns:adec="http://schemas.microsoft.com/office/drawing/2017/decorative" val="1"/>
-              </a:ext>
-            </a:extLst>
-          </p:cNvPr>
-          <p:cNvSpPr>
-            <a:spLocks noGrp="1" noRot="1" noChangeAspect="1" noMove="1" noResize="1" noEditPoints="1" noAdjustHandles="1" noChangeArrowheads="1" noChangeShapeType="1" noTextEdit="1"/>
-          </p:cNvSpPr>
-          <p:nvPr>
-            <p:extLst>
-              <p:ext uri="{386F3935-93C4-4BCD-93E2-E3B085C9AB24}">
-                <p16:designElem xmlns:p16="http://schemas.microsoft.com/office/powerpoint/2015/main" val="1"/>
-              </p:ext>
-            </p:extLst>
-          </p:nvPr>
-        </p:nvSpPr>
-        <p:spPr bwMode="auto">
-          <a:xfrm>
-            <a:off x="7062174" y="1653645"/>
-            <a:ext cx="4689240" cy="4115025"/>
-          </a:xfrm>
-          <a:custGeom>
-            <a:avLst/>
-            <a:gdLst>
-              <a:gd name="T0" fmla="*/ 781 w 1099"/>
-              <a:gd name="T1" fmla="*/ 0 h 968"/>
-              <a:gd name="T2" fmla="*/ 318 w 1099"/>
-              <a:gd name="T3" fmla="*/ 0 h 968"/>
-              <a:gd name="T4" fmla="*/ 246 w 1099"/>
-              <a:gd name="T5" fmla="*/ 42 h 968"/>
-              <a:gd name="T6" fmla="*/ 15 w 1099"/>
-              <a:gd name="T7" fmla="*/ 443 h 968"/>
-              <a:gd name="T8" fmla="*/ 15 w 1099"/>
-              <a:gd name="T9" fmla="*/ 525 h 968"/>
-              <a:gd name="T10" fmla="*/ 246 w 1099"/>
-              <a:gd name="T11" fmla="*/ 926 h 968"/>
-              <a:gd name="T12" fmla="*/ 318 w 1099"/>
-              <a:gd name="T13" fmla="*/ 968 h 968"/>
-              <a:gd name="T14" fmla="*/ 781 w 1099"/>
-              <a:gd name="T15" fmla="*/ 968 h 968"/>
-              <a:gd name="T16" fmla="*/ 852 w 1099"/>
-              <a:gd name="T17" fmla="*/ 926 h 968"/>
-              <a:gd name="T18" fmla="*/ 1084 w 1099"/>
-              <a:gd name="T19" fmla="*/ 525 h 968"/>
-              <a:gd name="T20" fmla="*/ 1084 w 1099"/>
-              <a:gd name="T21" fmla="*/ 443 h 968"/>
-              <a:gd name="T22" fmla="*/ 852 w 1099"/>
-              <a:gd name="T23" fmla="*/ 42 h 968"/>
-              <a:gd name="T24" fmla="*/ 781 w 1099"/>
-              <a:gd name="T25" fmla="*/ 0 h 968"/>
-            </a:gdLst>
-            <a:ahLst/>
-            <a:cxnLst>
-              <a:cxn ang="0">
-                <a:pos x="T0" y="T1"/>
-              </a:cxn>
-              <a:cxn ang="0">
-                <a:pos x="T2" y="T3"/>
-              </a:cxn>
-              <a:cxn ang="0">
-                <a:pos x="T4" y="T5"/>
-              </a:cxn>
-              <a:cxn ang="0">
-                <a:pos x="T6" y="T7"/>
-              </a:cxn>
-              <a:cxn ang="0">
-                <a:pos x="T8" y="T9"/>
-              </a:cxn>
-              <a:cxn ang="0">
-                <a:pos x="T10" y="T11"/>
-              </a:cxn>
-              <a:cxn ang="0">
-                <a:pos x="T12" y="T13"/>
-              </a:cxn>
-              <a:cxn ang="0">
-                <a:pos x="T14" y="T15"/>
-              </a:cxn>
-              <a:cxn ang="0">
-                <a:pos x="T16" y="T17"/>
-              </a:cxn>
-              <a:cxn ang="0">
-                <a:pos x="T18" y="T19"/>
-              </a:cxn>
-              <a:cxn ang="0">
-                <a:pos x="T20" y="T21"/>
-              </a:cxn>
-              <a:cxn ang="0">
-                <a:pos x="T22" y="T23"/>
-              </a:cxn>
-              <a:cxn ang="0">
-                <a:pos x="T24" y="T25"/>
-              </a:cxn>
-            </a:cxnLst>
-            <a:rect l="0" t="0" r="r" b="b"/>
-            <a:pathLst>
-              <a:path w="1099" h="968">
-                <a:moveTo>
-                  <a:pt x="781" y="0"/>
-                </a:moveTo>
-                <a:cubicBezTo>
-                  <a:pt x="318" y="0"/>
-                  <a:pt x="318" y="0"/>
-                  <a:pt x="318" y="0"/>
-                </a:cubicBezTo>
-                <a:cubicBezTo>
-                  <a:pt x="288" y="0"/>
-                  <a:pt x="261" y="16"/>
-                  <a:pt x="246" y="42"/>
-                </a:cubicBezTo>
-                <a:cubicBezTo>
-                  <a:pt x="15" y="443"/>
-                  <a:pt x="15" y="443"/>
-                  <a:pt x="15" y="443"/>
-                </a:cubicBezTo>
-                <a:cubicBezTo>
-                  <a:pt x="0" y="468"/>
-                  <a:pt x="0" y="500"/>
-                  <a:pt x="15" y="525"/>
-                </a:cubicBezTo>
-                <a:cubicBezTo>
-                  <a:pt x="246" y="926"/>
-                  <a:pt x="246" y="926"/>
-                  <a:pt x="246" y="926"/>
-                </a:cubicBezTo>
-                <a:cubicBezTo>
-                  <a:pt x="261" y="952"/>
-                  <a:pt x="288" y="968"/>
-                  <a:pt x="318" y="968"/>
-                </a:cubicBezTo>
-                <a:cubicBezTo>
-                  <a:pt x="781" y="968"/>
-                  <a:pt x="781" y="968"/>
-                  <a:pt x="781" y="968"/>
-                </a:cubicBezTo>
-                <a:cubicBezTo>
-                  <a:pt x="810" y="968"/>
-                  <a:pt x="838" y="952"/>
-                  <a:pt x="852" y="926"/>
-                </a:cubicBezTo>
-                <a:cubicBezTo>
-                  <a:pt x="1084" y="525"/>
-                  <a:pt x="1084" y="525"/>
-                  <a:pt x="1084" y="525"/>
-                </a:cubicBezTo>
-                <a:cubicBezTo>
-                  <a:pt x="1099" y="500"/>
-                  <a:pt x="1099" y="468"/>
-                  <a:pt x="1084" y="443"/>
-                </a:cubicBezTo>
-                <a:cubicBezTo>
-                  <a:pt x="852" y="42"/>
-                  <a:pt x="852" y="42"/>
-                  <a:pt x="852" y="42"/>
-                </a:cubicBezTo>
-                <a:cubicBezTo>
-                  <a:pt x="838" y="16"/>
-                  <a:pt x="810" y="0"/>
-                  <a:pt x="781" y="0"/>
-                </a:cubicBezTo>
-                <a:close/>
-              </a:path>
-            </a:pathLst>
-          </a:custGeom>
-          <a:noFill/>
-          <a:ln w="50800" cap="flat">
-            <a:solidFill>
-              <a:schemeClr val="tx1"/>
-            </a:solidFill>
-            <a:prstDash val="solid"/>
-            <a:miter lim="800000"/>
-            <a:headEnd/>
-            <a:tailEnd/>
-          </a:ln>
-        </p:spPr>
-        <p:txBody>
-          <a:bodyPr vert="horz" wrap="square" lIns="91440" tIns="45720" rIns="91440" bIns="45720" numCol="1" anchor="t" anchorCtr="0" compatLnSpc="1">
-            <a:prstTxWarp prst="textNoShape">
-              <a:avLst/>
-            </a:prstTxWarp>
-          </a:bodyPr>
-          <a:lstStyle/>
-          <a:p>
-            <a:endParaRPr lang="en-US" dirty="0"/>
-          </a:p>
-        </p:txBody>
-      </p:sp>
-      <p:sp>
-        <p:nvSpPr>
-          <p:cNvPr id="39" name="Freeform: Shape 38">
-            <a:extLst>
-              <a:ext uri="{FF2B5EF4-FFF2-40B4-BE49-F238E27FC236}">
-                <a16:creationId xmlns:a16="http://schemas.microsoft.com/office/drawing/2014/main" id="{0DB06EAB-7D8C-403A-86C5-B5FD79A13650}"/>
-              </a:ext>
-              <a:ext uri="{C183D7F6-B498-43B3-948B-1728B52AA6E4}">
-                <adec:decorative xmlns:adec="http://schemas.microsoft.com/office/drawing/2017/decorative" val="1"/>
-              </a:ext>
-            </a:extLst>
-          </p:cNvPr>
-          <p:cNvSpPr>
-            <a:spLocks noGrp="1" noRot="1" noChangeAspect="1" noMove="1" noResize="1" noEditPoints="1" noAdjustHandles="1" noChangeArrowheads="1" noChangeShapeType="1" noTextEdit="1"/>
-          </p:cNvSpPr>
-          <p:nvPr>
-            <p:extLst>
-              <p:ext uri="{386F3935-93C4-4BCD-93E2-E3B085C9AB24}">
-                <p16:designElem xmlns:p16="http://schemas.microsoft.com/office/powerpoint/2015/main" val="1"/>
-              </p:ext>
-            </p:extLst>
-          </p:nvPr>
-        </p:nvSpPr>
-        <p:spPr>
-          <a:xfrm>
-            <a:off x="4542865" y="634058"/>
-            <a:ext cx="3154669" cy="2796247"/>
-          </a:xfrm>
-          <a:custGeom>
-            <a:avLst/>
-            <a:gdLst>
-              <a:gd name="connsiteX0" fmla="*/ 853538 w 2991693"/>
-              <a:gd name="connsiteY0" fmla="*/ 0 h 2651787"/>
-              <a:gd name="connsiteX1" fmla="*/ 2141030 w 2991693"/>
-              <a:gd name="connsiteY1" fmla="*/ 0 h 2651787"/>
-              <a:gd name="connsiteX2" fmla="*/ 2324957 w 2991693"/>
-              <a:gd name="connsiteY2" fmla="*/ 103466 h 2651787"/>
-              <a:gd name="connsiteX3" fmla="*/ 2968702 w 2991693"/>
-              <a:gd name="connsiteY3" fmla="*/ 1218596 h 2651787"/>
-              <a:gd name="connsiteX4" fmla="*/ 2968702 w 2991693"/>
-              <a:gd name="connsiteY4" fmla="*/ 1433192 h 2651787"/>
-              <a:gd name="connsiteX5" fmla="*/ 2324957 w 2991693"/>
-              <a:gd name="connsiteY5" fmla="*/ 2548321 h 2651787"/>
-              <a:gd name="connsiteX6" fmla="*/ 2141030 w 2991693"/>
-              <a:gd name="connsiteY6" fmla="*/ 2651787 h 2651787"/>
-              <a:gd name="connsiteX7" fmla="*/ 853538 w 2991693"/>
-              <a:gd name="connsiteY7" fmla="*/ 2651787 h 2651787"/>
-              <a:gd name="connsiteX8" fmla="*/ 669612 w 2991693"/>
-              <a:gd name="connsiteY8" fmla="*/ 2548321 h 2651787"/>
-              <a:gd name="connsiteX9" fmla="*/ 25866 w 2991693"/>
-              <a:gd name="connsiteY9" fmla="*/ 1433192 h 2651787"/>
-              <a:gd name="connsiteX10" fmla="*/ 25866 w 2991693"/>
-              <a:gd name="connsiteY10" fmla="*/ 1218596 h 2651787"/>
-              <a:gd name="connsiteX11" fmla="*/ 669612 w 2991693"/>
-              <a:gd name="connsiteY11" fmla="*/ 103466 h 2651787"/>
-              <a:gd name="connsiteX12" fmla="*/ 853538 w 2991693"/>
-              <a:gd name="connsiteY12" fmla="*/ 0 h 2651787"/>
-            </a:gdLst>
-            <a:ahLst/>
-            <a:cxnLst>
-              <a:cxn ang="0">
-                <a:pos x="connsiteX0" y="connsiteY0"/>
-              </a:cxn>
-              <a:cxn ang="0">
-                <a:pos x="connsiteX1" y="connsiteY1"/>
-              </a:cxn>
-              <a:cxn ang="0">
-                <a:pos x="connsiteX2" y="connsiteY2"/>
-              </a:cxn>
-              <a:cxn ang="0">
-                <a:pos x="connsiteX3" y="connsiteY3"/>
-              </a:cxn>
-              <a:cxn ang="0">
-                <a:pos x="connsiteX4" y="connsiteY4"/>
-              </a:cxn>
-              <a:cxn ang="0">
-                <a:pos x="connsiteX5" y="connsiteY5"/>
-              </a:cxn>
-              <a:cxn ang="0">
-                <a:pos x="connsiteX6" y="connsiteY6"/>
-              </a:cxn>
-              <a:cxn ang="0">
-                <a:pos x="connsiteX7" y="connsiteY7"/>
-              </a:cxn>
-              <a:cxn ang="0">
-                <a:pos x="connsiteX8" y="connsiteY8"/>
-              </a:cxn>
-              <a:cxn ang="0">
-                <a:pos x="connsiteX9" y="connsiteY9"/>
-              </a:cxn>
-              <a:cxn ang="0">
-                <a:pos x="connsiteX10" y="connsiteY10"/>
-              </a:cxn>
-              <a:cxn ang="0">
-                <a:pos x="connsiteX11" y="connsiteY11"/>
-              </a:cxn>
-              <a:cxn ang="0">
-                <a:pos x="connsiteX12" y="connsiteY12"/>
-              </a:cxn>
-            </a:cxnLst>
-            <a:rect l="l" t="t" r="r" b="b"/>
-            <a:pathLst>
-              <a:path w="2991693" h="2651787">
-                <a:moveTo>
-                  <a:pt x="853538" y="0"/>
-                </a:moveTo>
-                <a:cubicBezTo>
-                  <a:pt x="2141030" y="0"/>
-                  <a:pt x="2141030" y="0"/>
-                  <a:pt x="2141030" y="0"/>
-                </a:cubicBezTo>
-                <a:cubicBezTo>
-                  <a:pt x="2206170" y="0"/>
-                  <a:pt x="2290471" y="45985"/>
-                  <a:pt x="2324957" y="103466"/>
-                </a:cubicBezTo>
-                <a:cubicBezTo>
-                  <a:pt x="2968702" y="1218596"/>
-                  <a:pt x="2968702" y="1218596"/>
-                  <a:pt x="2968702" y="1218596"/>
-                </a:cubicBezTo>
-                <a:cubicBezTo>
-                  <a:pt x="2999357" y="1279909"/>
-                  <a:pt x="2999357" y="1371878"/>
-                  <a:pt x="2968702" y="1433192"/>
-                </a:cubicBezTo>
-                <a:cubicBezTo>
-                  <a:pt x="2324957" y="2548321"/>
-                  <a:pt x="2324957" y="2548321"/>
-                  <a:pt x="2324957" y="2548321"/>
-                </a:cubicBezTo>
-                <a:cubicBezTo>
-                  <a:pt x="2290471" y="2605803"/>
-                  <a:pt x="2206170" y="2651787"/>
-                  <a:pt x="2141030" y="2651787"/>
-                </a:cubicBezTo>
-                <a:lnTo>
-                  <a:pt x="853538" y="2651787"/>
-                </a:lnTo>
-                <a:cubicBezTo>
-                  <a:pt x="784566" y="2651787"/>
-                  <a:pt x="700266" y="2605803"/>
-                  <a:pt x="669612" y="2548321"/>
-                </a:cubicBezTo>
-                <a:cubicBezTo>
-                  <a:pt x="25866" y="1433192"/>
-                  <a:pt x="25866" y="1433192"/>
-                  <a:pt x="25866" y="1433192"/>
-                </a:cubicBezTo>
-                <a:cubicBezTo>
-                  <a:pt x="-8621" y="1371878"/>
-                  <a:pt x="-8621" y="1279909"/>
-                  <a:pt x="25866" y="1218596"/>
-                </a:cubicBezTo>
-                <a:cubicBezTo>
-                  <a:pt x="669612" y="103466"/>
-                  <a:pt x="669612" y="103466"/>
-                  <a:pt x="669612" y="103466"/>
-                </a:cubicBezTo>
-                <a:cubicBezTo>
-                  <a:pt x="700266" y="45985"/>
-                  <a:pt x="784566" y="0"/>
-                  <a:pt x="853538" y="0"/>
-                </a:cubicBezTo>
-                <a:close/>
-              </a:path>
-            </a:pathLst>
-          </a:custGeom>
-          <a:noFill/>
-          <a:ln w="50800" cap="flat">
-            <a:solidFill>
-              <a:schemeClr val="tx1"/>
-            </a:solidFill>
-            <a:prstDash val="solid"/>
-            <a:miter lim="800000"/>
-            <a:headEnd/>
-            <a:tailEnd/>
-          </a:ln>
-        </p:spPr>
-        <p:txBody>
-          <a:bodyPr vert="horz" wrap="square" lIns="91440" tIns="45720" rIns="91440" bIns="45720" numCol="1" anchor="t" anchorCtr="0" compatLnSpc="1">
-            <a:prstTxWarp prst="textNoShape">
-              <a:avLst/>
-            </a:prstTxWarp>
-          </a:bodyPr>
-          <a:lstStyle/>
-          <a:p>
-            <a:endParaRPr lang="en-US" dirty="0">
-              <a:solidFill>
-                <a:schemeClr val="tx1"/>
-              </a:solidFill>
-            </a:endParaRPr>
-          </a:p>
-        </p:txBody>
-      </p:sp>
-      <p:pic>
-        <p:nvPicPr>
-          <p:cNvPr id="5" name="Imagen 4">
-            <a:extLst>
-              <a:ext uri="{FF2B5EF4-FFF2-40B4-BE49-F238E27FC236}">
-                <a16:creationId xmlns:a16="http://schemas.microsoft.com/office/drawing/2014/main" id="{0BC84AEA-A741-60BA-7F1E-551FF399CAD0}"/>
-              </a:ext>
-            </a:extLst>
-          </p:cNvPr>
-          <p:cNvPicPr>
-            <a:picLocks noChangeAspect="1"/>
-          </p:cNvPicPr>
-          <p:nvPr/>
-        </p:nvPicPr>
-        <p:blipFill>
-          <a:blip r:embed="rId2"/>
-          <a:stretch>
-            <a:fillRect/>
-          </a:stretch>
-        </p:blipFill>
-        <p:spPr>
-          <a:xfrm>
-            <a:off x="768331" y="613851"/>
-            <a:ext cx="11021930" cy="6091751"/>
-          </a:xfrm>
-          <a:prstGeom prst="rect">
-            <a:avLst/>
-          </a:prstGeom>
-        </p:spPr>
-      </p:pic>
-      <p:sp>
-        <p:nvSpPr>
-          <p:cNvPr id="2" name="Título 1">
-            <a:extLst>
-              <a:ext uri="{FF2B5EF4-FFF2-40B4-BE49-F238E27FC236}">
-                <a16:creationId xmlns:a16="http://schemas.microsoft.com/office/drawing/2014/main" id="{90CEA315-B961-2F44-9A4B-846A71782950}"/>
-              </a:ext>
-            </a:extLst>
-          </p:cNvPr>
-          <p:cNvSpPr>
-            <a:spLocks noGrp="1"/>
-          </p:cNvSpPr>
-          <p:nvPr>
-            <p:ph type="title"/>
-          </p:nvPr>
-        </p:nvSpPr>
-        <p:spPr>
-          <a:xfrm>
-            <a:off x="615575" y="224883"/>
-            <a:ext cx="11576425" cy="432357"/>
-          </a:xfrm>
-        </p:spPr>
-        <p:txBody>
-          <a:bodyPr vert="horz" lIns="91440" tIns="45720" rIns="91440" bIns="45720" rtlCol="0" anchor="b">
-            <a:normAutofit/>
-          </a:bodyPr>
-          <a:lstStyle/>
-          <a:p>
-            <a:r>
-              <a:rPr lang="es-ES" sz="2400" noProof="1">
-                <a:solidFill>
-                  <a:schemeClr val="accent2">
-                    <a:lumMod val="75000"/>
-                  </a:schemeClr>
-                </a:solidFill>
-              </a:rPr>
-              <a:t>¿Cuántos perros y gatos fueron recogidos por refugios y protectoras de animales?</a:t>
-            </a:r>
-            <a:endParaRPr lang="es-EC" sz="2400" noProof="1">
-              <a:solidFill>
-                <a:schemeClr val="accent2">
-                  <a:lumMod val="75000"/>
-                </a:schemeClr>
-              </a:solidFill>
-            </a:endParaRPr>
-          </a:p>
-        </p:txBody>
-      </p:sp>
-    </p:spTree>
-    <p:extLst>
-      <p:ext uri="{BB962C8B-B14F-4D97-AF65-F5344CB8AC3E}">
-        <p14:creationId xmlns:p14="http://schemas.microsoft.com/office/powerpoint/2010/main" val="2132678998"/>
-      </p:ext>
-    </p:extLst>
-  </p:cSld>
-  <p:clrMapOvr>
-    <a:masterClrMapping/>
-  </p:clrMapOvr>
-  <p:timing>
-    <p:tnLst>
-      <p:par>
-        <p:cTn id="1" dur="indefinite" restart="never" nodeType="tmRoot">
-          <p:childTnLst>
-            <p:seq concurrent="1" nextAc="seek">
-              <p:cTn id="2" dur="indefinite" nodeType="mainSeq">
-                <p:childTnLst>
-                  <p:par>
-                    <p:cTn id="3" fill="hold">
-                      <p:stCondLst>
-                        <p:cond delay="indefinite"/>
-                        <p:cond evt="onBegin" delay="0">
-                          <p:tn val="2"/>
-                        </p:cond>
-                      </p:stCondLst>
-                      <p:childTnLst>
-                        <p:par>
-                          <p:cTn id="4" fill="hold">
-                            <p:stCondLst>
-                              <p:cond delay="0"/>
-                            </p:stCondLst>
-                            <p:childTnLst>
-                              <p:par>
-                                <p:cTn id="5" presetID="10" presetClass="entr" presetSubtype="0" fill="hold" grpId="0" nodeType="withEffect">
-                                  <p:stCondLst>
-                                    <p:cond delay="1000"/>
-                                  </p:stCondLst>
-                                  <p:iterate>
-                                    <p:tmPct val="10000"/>
-                                  </p:iterate>
-                                  <p:childTnLst>
-                                    <p:set>
-                                      <p:cBhvr>
-                                        <p:cTn id="6" dur="1" fill="hold">
-                                          <p:stCondLst>
-                                            <p:cond delay="0"/>
-                                          </p:stCondLst>
-                                        </p:cTn>
-                                        <p:tgtEl>
-                                          <p:spTgt spid="2"/>
-                                        </p:tgtEl>
-                                        <p:attrNameLst>
-                                          <p:attrName>style.visibility</p:attrName>
-                                        </p:attrNameLst>
-                                      </p:cBhvr>
-                                      <p:to>
-                                        <p:strVal val="visible"/>
-                                      </p:to>
-                                    </p:set>
-                                    <p:animEffect transition="in" filter="fade">
-                                      <p:cBhvr>
-                                        <p:cTn id="7" dur="700"/>
-                                        <p:tgtEl>
-                                          <p:spTgt spid="2"/>
-                                        </p:tgtEl>
-                                      </p:cBhvr>
-                                    </p:animEffect>
-                                  </p:childTnLst>
-                                </p:cTn>
-                              </p:par>
-                            </p:childTnLst>
-                          </p:cTn>
-                        </p:par>
-                      </p:childTnLst>
-                    </p:cTn>
-                  </p:par>
-                </p:childTnLst>
-              </p:cTn>
-              <p:prevCondLst>
-                <p:cond evt="onPrev" delay="0">
-                  <p:tgtEl>
-                    <p:sldTgt/>
-                  </p:tgtEl>
-                </p:cond>
-              </p:prevCondLst>
-              <p:nextCondLst>
-                <p:cond evt="onNext" delay="0">
-                  <p:tgtEl>
-                    <p:sldTgt/>
-                  </p:tgtEl>
-                </p:cond>
-              </p:nextCondLst>
-            </p:seq>
-          </p:childTnLst>
-        </p:cTn>
-      </p:par>
-    </p:tnLst>
-    <p:bldLst>
-      <p:bldP spid="2" grpId="0"/>
-    </p:bldLst>
-  </p:timing>
-</p:sld>
-</file>
-
-<file path=ppt/slides/slide4.xml><?xml version="1.0" encoding="utf-8"?>
-<p:sld xmlns:a="http://schemas.openxmlformats.org/drawingml/2006/main" xmlns:r="http://schemas.openxmlformats.org/officeDocument/2006/relationships" xmlns:p="http://schemas.openxmlformats.org/presentationml/2006/main">
-  <p:cSld>
-    <p:bg>
-      <p:bgPr>
-        <a:solidFill>
-          <a:schemeClr val="bg1"/>
-        </a:solidFill>
-        <a:effectLst/>
-      </p:bgPr>
-    </p:bg>
-    <p:spTree>
-      <p:nvGrpSpPr>
-        <p:cNvPr id="1" name=""/>
-        <p:cNvGrpSpPr/>
-        <p:nvPr/>
-      </p:nvGrpSpPr>
-      <p:grpSpPr>
-        <a:xfrm>
-          <a:off x="0" y="0"/>
-          <a:ext cx="0" cy="0"/>
-          <a:chOff x="0" y="0"/>
-          <a:chExt cx="0" cy="0"/>
-        </a:xfrm>
-      </p:grpSpPr>
-      <p:sp useBgFill="1">
-        <p:nvSpPr>
-          <p:cNvPr id="36" name="Rectangle 30">
-            <a:extLst>
-              <a:ext uri="{FF2B5EF4-FFF2-40B4-BE49-F238E27FC236}">
-                <a16:creationId xmlns:a16="http://schemas.microsoft.com/office/drawing/2014/main" id="{C4E4288A-DFC8-40A2-90E5-70E851A933AD}"/>
-              </a:ext>
-              <a:ext uri="{C183D7F6-B498-43B3-948B-1728B52AA6E4}">
-                <adec:decorative xmlns:adec="http://schemas.microsoft.com/office/drawing/2017/decorative" val="1"/>
-              </a:ext>
-            </a:extLst>
-          </p:cNvPr>
-          <p:cNvSpPr>
-            <a:spLocks noGrp="1" noRot="1" noChangeAspect="1" noMove="1" noResize="1" noEditPoints="1" noAdjustHandles="1" noChangeArrowheads="1" noChangeShapeType="1" noTextEdit="1"/>
-          </p:cNvSpPr>
-          <p:nvPr>
-            <p:extLst>
-              <p:ext uri="{386F3935-93C4-4BCD-93E2-E3B085C9AB24}">
-                <p16:designElem xmlns:p16="http://schemas.microsoft.com/office/powerpoint/2015/main" val="1"/>
-              </p:ext>
-            </p:extLst>
-          </p:nvPr>
-        </p:nvSpPr>
-        <p:spPr>
-          <a:xfrm>
-            <a:off x="0" y="0"/>
-            <a:ext cx="12192000" cy="6858000"/>
-          </a:xfrm>
-          <a:prstGeom prst="rect">
-            <a:avLst/>
-          </a:prstGeom>
-          <a:ln>
-            <a:noFill/>
-          </a:ln>
-        </p:spPr>
-        <p:style>
-          <a:lnRef idx="2">
-            <a:schemeClr val="accent1">
-              <a:shade val="50000"/>
-            </a:schemeClr>
-          </a:lnRef>
-          <a:fillRef idx="1">
-            <a:schemeClr val="accent1"/>
-          </a:fillRef>
-          <a:effectRef idx="0">
-            <a:schemeClr val="accent1"/>
-          </a:effectRef>
-          <a:fontRef idx="minor">
-            <a:schemeClr val="lt1"/>
-          </a:fontRef>
-        </p:style>
-        <p:txBody>
-          <a:bodyPr rtlCol="0" anchor="ctr"/>
-          <a:lstStyle/>
-          <a:p>
-            <a:pPr algn="ctr"/>
-            <a:endParaRPr lang="en-US"/>
-          </a:p>
-        </p:txBody>
-      </p:sp>
-      <p:grpSp>
-        <p:nvGrpSpPr>
-          <p:cNvPr id="38" name="Group 32">
-            <a:extLst>
-              <a:ext uri="{FF2B5EF4-FFF2-40B4-BE49-F238E27FC236}">
-                <a16:creationId xmlns:a16="http://schemas.microsoft.com/office/drawing/2014/main" id="{B63C2D82-D4FA-4A37-BB01-1E7B21E4FF20}"/>
-              </a:ext>
-              <a:ext uri="{C183D7F6-B498-43B3-948B-1728B52AA6E4}">
-                <adec:decorative xmlns:adec="http://schemas.microsoft.com/office/drawing/2017/decorative" val="1"/>
-              </a:ext>
-            </a:extLst>
-          </p:cNvPr>
-          <p:cNvGrpSpPr>
-            <a:grpSpLocks noGrp="1" noUngrp="1" noRot="1" noChangeAspect="1" noMove="1" noResize="1"/>
-          </p:cNvGrpSpPr>
-          <p:nvPr>
-            <p:extLst>
-              <p:ext uri="{386F3935-93C4-4BCD-93E2-E3B085C9AB24}">
-                <p16:designElem xmlns:p16="http://schemas.microsoft.com/office/powerpoint/2015/main" val="1"/>
-              </p:ext>
-            </p:extLst>
-          </p:nvPr>
-        </p:nvGrpSpPr>
-        <p:grpSpPr>
-          <a:xfrm>
-            <a:off x="965199" y="634058"/>
-            <a:ext cx="1128382" cy="847206"/>
-            <a:chOff x="5307830" y="325570"/>
-            <a:chExt cx="1128382" cy="847206"/>
-          </a:xfrm>
-        </p:grpSpPr>
-        <p:sp>
-          <p:nvSpPr>
-            <p:cNvPr id="34" name="Freeform 5">
-              <a:extLst>
-                <a:ext uri="{FF2B5EF4-FFF2-40B4-BE49-F238E27FC236}">
-                  <a16:creationId xmlns:a16="http://schemas.microsoft.com/office/drawing/2014/main" id="{C94E7FEF-0CE9-4AC2-94BB-02230C6DC0DF}"/>
-                </a:ext>
-                <a:ext uri="{C183D7F6-B498-43B3-948B-1728B52AA6E4}">
-                  <adec:decorative xmlns:adec="http://schemas.microsoft.com/office/drawing/2017/decorative" val="1"/>
-                </a:ext>
-              </a:extLst>
-            </p:cNvPr>
-            <p:cNvSpPr>
-              <a:spLocks/>
-            </p:cNvSpPr>
-            <p:nvPr>
-              <p:extLst>
-                <p:ext uri="{386F3935-93C4-4BCD-93E2-E3B085C9AB24}">
-                  <p16:designElem xmlns:p16="http://schemas.microsoft.com/office/powerpoint/2015/main" val="1"/>
-                </p:ext>
-              </p:extLst>
-            </p:nvPr>
-          </p:nvSpPr>
-          <p:spPr bwMode="auto">
-            <a:xfrm>
-              <a:off x="5307830" y="577396"/>
-              <a:ext cx="675351" cy="595380"/>
-            </a:xfrm>
-            <a:custGeom>
-              <a:avLst/>
-              <a:gdLst>
-                <a:gd name="T0" fmla="*/ 225 w 785"/>
-                <a:gd name="T1" fmla="*/ 692 h 692"/>
-                <a:gd name="T2" fmla="*/ 177 w 785"/>
-                <a:gd name="T3" fmla="*/ 665 h 692"/>
-                <a:gd name="T4" fmla="*/ 9 w 785"/>
-                <a:gd name="T5" fmla="*/ 374 h 692"/>
-                <a:gd name="T6" fmla="*/ 9 w 785"/>
-                <a:gd name="T7" fmla="*/ 318 h 692"/>
-                <a:gd name="T8" fmla="*/ 177 w 785"/>
-                <a:gd name="T9" fmla="*/ 27 h 692"/>
-                <a:gd name="T10" fmla="*/ 225 w 785"/>
-                <a:gd name="T11" fmla="*/ 0 h 692"/>
-                <a:gd name="T12" fmla="*/ 561 w 785"/>
-                <a:gd name="T13" fmla="*/ 0 h 692"/>
-                <a:gd name="T14" fmla="*/ 609 w 785"/>
-                <a:gd name="T15" fmla="*/ 27 h 692"/>
-                <a:gd name="T16" fmla="*/ 777 w 785"/>
-                <a:gd name="T17" fmla="*/ 318 h 692"/>
-                <a:gd name="T18" fmla="*/ 777 w 785"/>
-                <a:gd name="T19" fmla="*/ 374 h 692"/>
-                <a:gd name="T20" fmla="*/ 609 w 785"/>
-                <a:gd name="T21" fmla="*/ 665 h 692"/>
-                <a:gd name="T22" fmla="*/ 561 w 785"/>
-                <a:gd name="T23" fmla="*/ 692 h 692"/>
-                <a:gd name="T24" fmla="*/ 225 w 785"/>
-                <a:gd name="T25" fmla="*/ 692 h 692"/>
-              </a:gdLst>
-              <a:ahLst/>
-              <a:cxnLst>
-                <a:cxn ang="0">
-                  <a:pos x="T0" y="T1"/>
-                </a:cxn>
-                <a:cxn ang="0">
-                  <a:pos x="T2" y="T3"/>
-                </a:cxn>
-                <a:cxn ang="0">
-                  <a:pos x="T4" y="T5"/>
-                </a:cxn>
-                <a:cxn ang="0">
-                  <a:pos x="T6" y="T7"/>
-                </a:cxn>
-                <a:cxn ang="0">
-                  <a:pos x="T8" y="T9"/>
-                </a:cxn>
-                <a:cxn ang="0">
-                  <a:pos x="T10" y="T11"/>
-                </a:cxn>
-                <a:cxn ang="0">
-                  <a:pos x="T12" y="T13"/>
-                </a:cxn>
-                <a:cxn ang="0">
-                  <a:pos x="T14" y="T15"/>
-                </a:cxn>
-                <a:cxn ang="0">
-                  <a:pos x="T16" y="T17"/>
-                </a:cxn>
-                <a:cxn ang="0">
-                  <a:pos x="T18" y="T19"/>
-                </a:cxn>
-                <a:cxn ang="0">
-                  <a:pos x="T20" y="T21"/>
-                </a:cxn>
-                <a:cxn ang="0">
-                  <a:pos x="T22" y="T23"/>
-                </a:cxn>
-                <a:cxn ang="0">
-                  <a:pos x="T24" y="T25"/>
-                </a:cxn>
-              </a:cxnLst>
-              <a:rect l="0" t="0" r="r" b="b"/>
-              <a:pathLst>
-                <a:path w="785" h="692">
-                  <a:moveTo>
-                    <a:pt x="225" y="692"/>
-                  </a:moveTo>
-                  <a:cubicBezTo>
-                    <a:pt x="207" y="692"/>
-                    <a:pt x="185" y="680"/>
-                    <a:pt x="177" y="665"/>
-                  </a:cubicBezTo>
-                  <a:cubicBezTo>
-                    <a:pt x="9" y="374"/>
-                    <a:pt x="9" y="374"/>
-                    <a:pt x="9" y="374"/>
-                  </a:cubicBezTo>
-                  <a:cubicBezTo>
-                    <a:pt x="0" y="358"/>
-                    <a:pt x="0" y="334"/>
-                    <a:pt x="9" y="318"/>
-                  </a:cubicBezTo>
-                  <a:cubicBezTo>
-                    <a:pt x="177" y="27"/>
-                    <a:pt x="177" y="27"/>
-                    <a:pt x="177" y="27"/>
-                  </a:cubicBezTo>
-                  <a:cubicBezTo>
-                    <a:pt x="185" y="12"/>
-                    <a:pt x="207" y="0"/>
-                    <a:pt x="225" y="0"/>
-                  </a:cubicBezTo>
-                  <a:cubicBezTo>
-                    <a:pt x="561" y="0"/>
-                    <a:pt x="561" y="0"/>
-                    <a:pt x="561" y="0"/>
-                  </a:cubicBezTo>
-                  <a:cubicBezTo>
-                    <a:pt x="578" y="0"/>
-                    <a:pt x="600" y="12"/>
-                    <a:pt x="609" y="27"/>
-                  </a:cubicBezTo>
-                  <a:cubicBezTo>
-                    <a:pt x="777" y="318"/>
-                    <a:pt x="777" y="318"/>
-                    <a:pt x="777" y="318"/>
-                  </a:cubicBezTo>
-                  <a:cubicBezTo>
-                    <a:pt x="785" y="334"/>
-                    <a:pt x="785" y="358"/>
-                    <a:pt x="777" y="374"/>
-                  </a:cubicBezTo>
-                  <a:cubicBezTo>
-                    <a:pt x="609" y="665"/>
-                    <a:pt x="609" y="665"/>
-                    <a:pt x="609" y="665"/>
-                  </a:cubicBezTo>
-                  <a:cubicBezTo>
-                    <a:pt x="600" y="680"/>
-                    <a:pt x="578" y="692"/>
-                    <a:pt x="561" y="692"/>
-                  </a:cubicBezTo>
-                  <a:lnTo>
-                    <a:pt x="225" y="692"/>
-                  </a:lnTo>
-                  <a:close/>
-                </a:path>
-              </a:pathLst>
-            </a:custGeom>
-            <a:noFill/>
-            <a:ln w="28575" cmpd="sng">
-              <a:solidFill>
-                <a:schemeClr val="tx1"/>
-              </a:solidFill>
-            </a:ln>
-          </p:spPr>
-          <p:txBody>
-            <a:bodyPr vert="horz" wrap="square" lIns="91440" tIns="45720" rIns="91440" bIns="45720" numCol="1" anchor="t" anchorCtr="0" compatLnSpc="1">
-              <a:prstTxWarp prst="textNoShape">
-                <a:avLst/>
-              </a:prstTxWarp>
-            </a:bodyPr>
-            <a:lstStyle/>
-            <a:p>
-              <a:endParaRPr lang="en-US"/>
-            </a:p>
-          </p:txBody>
-        </p:sp>
-        <p:sp>
-          <p:nvSpPr>
-            <p:cNvPr id="35" name="Freeform 5">
-              <a:extLst>
-                <a:ext uri="{FF2B5EF4-FFF2-40B4-BE49-F238E27FC236}">
-                  <a16:creationId xmlns:a16="http://schemas.microsoft.com/office/drawing/2014/main" id="{EB546CC0-C1BC-48D2-8DA9-4B60283165C9}"/>
-                </a:ext>
-                <a:ext uri="{C183D7F6-B498-43B3-948B-1728B52AA6E4}">
-                  <adec:decorative xmlns:adec="http://schemas.microsoft.com/office/drawing/2017/decorative" val="1"/>
-                </a:ext>
-              </a:extLst>
-            </p:cNvPr>
-            <p:cNvSpPr>
-              <a:spLocks/>
-            </p:cNvSpPr>
-            <p:nvPr>
-              <p:extLst>
-                <p:ext uri="{386F3935-93C4-4BCD-93E2-E3B085C9AB24}">
-                  <p16:designElem xmlns:p16="http://schemas.microsoft.com/office/powerpoint/2015/main" val="1"/>
-                </p:ext>
-              </p:extLst>
-            </p:nvPr>
-          </p:nvSpPr>
-          <p:spPr bwMode="auto">
-            <a:xfrm>
-              <a:off x="5885720" y="325570"/>
-              <a:ext cx="550492" cy="485306"/>
-            </a:xfrm>
-            <a:custGeom>
-              <a:avLst/>
-              <a:gdLst>
-                <a:gd name="T0" fmla="*/ 225 w 785"/>
-                <a:gd name="T1" fmla="*/ 692 h 692"/>
-                <a:gd name="T2" fmla="*/ 177 w 785"/>
-                <a:gd name="T3" fmla="*/ 665 h 692"/>
-                <a:gd name="T4" fmla="*/ 9 w 785"/>
-                <a:gd name="T5" fmla="*/ 374 h 692"/>
-                <a:gd name="T6" fmla="*/ 9 w 785"/>
-                <a:gd name="T7" fmla="*/ 318 h 692"/>
-                <a:gd name="T8" fmla="*/ 177 w 785"/>
-                <a:gd name="T9" fmla="*/ 27 h 692"/>
-                <a:gd name="T10" fmla="*/ 225 w 785"/>
-                <a:gd name="T11" fmla="*/ 0 h 692"/>
-                <a:gd name="T12" fmla="*/ 561 w 785"/>
-                <a:gd name="T13" fmla="*/ 0 h 692"/>
-                <a:gd name="T14" fmla="*/ 609 w 785"/>
-                <a:gd name="T15" fmla="*/ 27 h 692"/>
-                <a:gd name="T16" fmla="*/ 777 w 785"/>
-                <a:gd name="T17" fmla="*/ 318 h 692"/>
-                <a:gd name="T18" fmla="*/ 777 w 785"/>
-                <a:gd name="T19" fmla="*/ 374 h 692"/>
-                <a:gd name="T20" fmla="*/ 609 w 785"/>
-                <a:gd name="T21" fmla="*/ 665 h 692"/>
-                <a:gd name="T22" fmla="*/ 561 w 785"/>
-                <a:gd name="T23" fmla="*/ 692 h 692"/>
-                <a:gd name="T24" fmla="*/ 225 w 785"/>
-                <a:gd name="T25" fmla="*/ 692 h 692"/>
-              </a:gdLst>
-              <a:ahLst/>
-              <a:cxnLst>
-                <a:cxn ang="0">
-                  <a:pos x="T0" y="T1"/>
-                </a:cxn>
-                <a:cxn ang="0">
-                  <a:pos x="T2" y="T3"/>
-                </a:cxn>
-                <a:cxn ang="0">
-                  <a:pos x="T4" y="T5"/>
-                </a:cxn>
-                <a:cxn ang="0">
-                  <a:pos x="T6" y="T7"/>
-                </a:cxn>
-                <a:cxn ang="0">
-                  <a:pos x="T8" y="T9"/>
-                </a:cxn>
-                <a:cxn ang="0">
-                  <a:pos x="T10" y="T11"/>
-                </a:cxn>
-                <a:cxn ang="0">
-                  <a:pos x="T12" y="T13"/>
-                </a:cxn>
-                <a:cxn ang="0">
-                  <a:pos x="T14" y="T15"/>
-                </a:cxn>
-                <a:cxn ang="0">
-                  <a:pos x="T16" y="T17"/>
-                </a:cxn>
-                <a:cxn ang="0">
-                  <a:pos x="T18" y="T19"/>
-                </a:cxn>
-                <a:cxn ang="0">
-                  <a:pos x="T20" y="T21"/>
-                </a:cxn>
-                <a:cxn ang="0">
-                  <a:pos x="T22" y="T23"/>
-                </a:cxn>
-                <a:cxn ang="0">
-                  <a:pos x="T24" y="T25"/>
-                </a:cxn>
-              </a:cxnLst>
-              <a:rect l="0" t="0" r="r" b="b"/>
-              <a:pathLst>
-                <a:path w="785" h="692">
-                  <a:moveTo>
-                    <a:pt x="225" y="692"/>
-                  </a:moveTo>
-                  <a:cubicBezTo>
-                    <a:pt x="207" y="692"/>
-                    <a:pt x="185" y="680"/>
-                    <a:pt x="177" y="665"/>
-                  </a:cubicBezTo>
-                  <a:cubicBezTo>
-                    <a:pt x="9" y="374"/>
-                    <a:pt x="9" y="374"/>
-                    <a:pt x="9" y="374"/>
-                  </a:cubicBezTo>
-                  <a:cubicBezTo>
-                    <a:pt x="0" y="358"/>
-                    <a:pt x="0" y="334"/>
-                    <a:pt x="9" y="318"/>
-                  </a:cubicBezTo>
-                  <a:cubicBezTo>
-                    <a:pt x="177" y="27"/>
-                    <a:pt x="177" y="27"/>
-                    <a:pt x="177" y="27"/>
-                  </a:cubicBezTo>
-                  <a:cubicBezTo>
-                    <a:pt x="185" y="12"/>
-                    <a:pt x="207" y="0"/>
-                    <a:pt x="225" y="0"/>
-                  </a:cubicBezTo>
-                  <a:cubicBezTo>
-                    <a:pt x="561" y="0"/>
-                    <a:pt x="561" y="0"/>
-                    <a:pt x="561" y="0"/>
-                  </a:cubicBezTo>
-                  <a:cubicBezTo>
-                    <a:pt x="578" y="0"/>
-                    <a:pt x="600" y="12"/>
-                    <a:pt x="609" y="27"/>
-                  </a:cubicBezTo>
-                  <a:cubicBezTo>
-                    <a:pt x="777" y="318"/>
-                    <a:pt x="777" y="318"/>
-                    <a:pt x="777" y="318"/>
-                  </a:cubicBezTo>
-                  <a:cubicBezTo>
-                    <a:pt x="785" y="334"/>
-                    <a:pt x="785" y="358"/>
-                    <a:pt x="777" y="374"/>
-                  </a:cubicBezTo>
-                  <a:cubicBezTo>
-                    <a:pt x="609" y="665"/>
-                    <a:pt x="609" y="665"/>
-                    <a:pt x="609" y="665"/>
-                  </a:cubicBezTo>
-                  <a:cubicBezTo>
-                    <a:pt x="600" y="680"/>
-                    <a:pt x="578" y="692"/>
-                    <a:pt x="561" y="692"/>
-                  </a:cubicBezTo>
-                  <a:lnTo>
-                    <a:pt x="225" y="692"/>
-                  </a:lnTo>
-                  <a:close/>
-                </a:path>
-              </a:pathLst>
-            </a:custGeom>
-            <a:noFill/>
-            <a:ln w="28575" cmpd="sng">
-              <a:solidFill>
-                <a:schemeClr val="tx1"/>
-              </a:solidFill>
-            </a:ln>
-          </p:spPr>
-          <p:txBody>
-            <a:bodyPr vert="horz" wrap="square" lIns="91440" tIns="45720" rIns="91440" bIns="45720" numCol="1" anchor="t" anchorCtr="0" compatLnSpc="1">
-              <a:prstTxWarp prst="textNoShape">
-                <a:avLst/>
-              </a:prstTxWarp>
-            </a:bodyPr>
-            <a:lstStyle/>
-            <a:p>
-              <a:endParaRPr lang="en-US"/>
-            </a:p>
-          </p:txBody>
-        </p:sp>
-      </p:grpSp>
-      <p:sp>
-        <p:nvSpPr>
-          <p:cNvPr id="37" name="Freeform 5">
-            <a:extLst>
-              <a:ext uri="{FF2B5EF4-FFF2-40B4-BE49-F238E27FC236}">
-                <a16:creationId xmlns:a16="http://schemas.microsoft.com/office/drawing/2014/main" id="{BD2BFF02-DF78-4F07-B176-52514E13127D}"/>
-              </a:ext>
-              <a:ext uri="{C183D7F6-B498-43B3-948B-1728B52AA6E4}">
-                <adec:decorative xmlns:adec="http://schemas.microsoft.com/office/drawing/2017/decorative" val="1"/>
-              </a:ext>
-            </a:extLst>
-          </p:cNvPr>
-          <p:cNvSpPr>
-            <a:spLocks noGrp="1" noRot="1" noChangeAspect="1" noMove="1" noResize="1" noEditPoints="1" noAdjustHandles="1" noChangeArrowheads="1" noChangeShapeType="1" noTextEdit="1"/>
-          </p:cNvSpPr>
-          <p:nvPr>
-            <p:extLst>
-              <p:ext uri="{386F3935-93C4-4BCD-93E2-E3B085C9AB24}">
-                <p16:designElem xmlns:p16="http://schemas.microsoft.com/office/powerpoint/2015/main" val="1"/>
-              </p:ext>
-            </p:extLst>
-          </p:nvPr>
-        </p:nvSpPr>
-        <p:spPr bwMode="auto">
-          <a:xfrm>
-            <a:off x="7062174" y="1653645"/>
-            <a:ext cx="4689240" cy="4115025"/>
-          </a:xfrm>
-          <a:custGeom>
-            <a:avLst/>
-            <a:gdLst>
-              <a:gd name="T0" fmla="*/ 781 w 1099"/>
-              <a:gd name="T1" fmla="*/ 0 h 968"/>
-              <a:gd name="T2" fmla="*/ 318 w 1099"/>
-              <a:gd name="T3" fmla="*/ 0 h 968"/>
-              <a:gd name="T4" fmla="*/ 246 w 1099"/>
-              <a:gd name="T5" fmla="*/ 42 h 968"/>
-              <a:gd name="T6" fmla="*/ 15 w 1099"/>
-              <a:gd name="T7" fmla="*/ 443 h 968"/>
-              <a:gd name="T8" fmla="*/ 15 w 1099"/>
-              <a:gd name="T9" fmla="*/ 525 h 968"/>
-              <a:gd name="T10" fmla="*/ 246 w 1099"/>
-              <a:gd name="T11" fmla="*/ 926 h 968"/>
-              <a:gd name="T12" fmla="*/ 318 w 1099"/>
-              <a:gd name="T13" fmla="*/ 968 h 968"/>
-              <a:gd name="T14" fmla="*/ 781 w 1099"/>
-              <a:gd name="T15" fmla="*/ 968 h 968"/>
-              <a:gd name="T16" fmla="*/ 852 w 1099"/>
-              <a:gd name="T17" fmla="*/ 926 h 968"/>
-              <a:gd name="T18" fmla="*/ 1084 w 1099"/>
-              <a:gd name="T19" fmla="*/ 525 h 968"/>
-              <a:gd name="T20" fmla="*/ 1084 w 1099"/>
-              <a:gd name="T21" fmla="*/ 443 h 968"/>
-              <a:gd name="T22" fmla="*/ 852 w 1099"/>
-              <a:gd name="T23" fmla="*/ 42 h 968"/>
-              <a:gd name="T24" fmla="*/ 781 w 1099"/>
-              <a:gd name="T25" fmla="*/ 0 h 968"/>
-            </a:gdLst>
-            <a:ahLst/>
-            <a:cxnLst>
-              <a:cxn ang="0">
-                <a:pos x="T0" y="T1"/>
-              </a:cxn>
-              <a:cxn ang="0">
-                <a:pos x="T2" y="T3"/>
-              </a:cxn>
-              <a:cxn ang="0">
-                <a:pos x="T4" y="T5"/>
-              </a:cxn>
-              <a:cxn ang="0">
-                <a:pos x="T6" y="T7"/>
-              </a:cxn>
-              <a:cxn ang="0">
-                <a:pos x="T8" y="T9"/>
-              </a:cxn>
-              <a:cxn ang="0">
-                <a:pos x="T10" y="T11"/>
-              </a:cxn>
-              <a:cxn ang="0">
-                <a:pos x="T12" y="T13"/>
-              </a:cxn>
-              <a:cxn ang="0">
-                <a:pos x="T14" y="T15"/>
-              </a:cxn>
-              <a:cxn ang="0">
-                <a:pos x="T16" y="T17"/>
-              </a:cxn>
-              <a:cxn ang="0">
-                <a:pos x="T18" y="T19"/>
-              </a:cxn>
-              <a:cxn ang="0">
-                <a:pos x="T20" y="T21"/>
-              </a:cxn>
-              <a:cxn ang="0">
-                <a:pos x="T22" y="T23"/>
-              </a:cxn>
-              <a:cxn ang="0">
-                <a:pos x="T24" y="T25"/>
-              </a:cxn>
-            </a:cxnLst>
-            <a:rect l="0" t="0" r="r" b="b"/>
-            <a:pathLst>
-              <a:path w="1099" h="968">
-                <a:moveTo>
-                  <a:pt x="781" y="0"/>
-                </a:moveTo>
-                <a:cubicBezTo>
-                  <a:pt x="318" y="0"/>
-                  <a:pt x="318" y="0"/>
-                  <a:pt x="318" y="0"/>
-                </a:cubicBezTo>
-                <a:cubicBezTo>
-                  <a:pt x="288" y="0"/>
-                  <a:pt x="261" y="16"/>
-                  <a:pt x="246" y="42"/>
-                </a:cubicBezTo>
-                <a:cubicBezTo>
-                  <a:pt x="15" y="443"/>
-                  <a:pt x="15" y="443"/>
-                  <a:pt x="15" y="443"/>
-                </a:cubicBezTo>
-                <a:cubicBezTo>
-                  <a:pt x="0" y="468"/>
-                  <a:pt x="0" y="500"/>
-                  <a:pt x="15" y="525"/>
-                </a:cubicBezTo>
-                <a:cubicBezTo>
-                  <a:pt x="246" y="926"/>
-                  <a:pt x="246" y="926"/>
-                  <a:pt x="246" y="926"/>
-                </a:cubicBezTo>
-                <a:cubicBezTo>
-                  <a:pt x="261" y="952"/>
-                  <a:pt x="288" y="968"/>
-                  <a:pt x="318" y="968"/>
-                </a:cubicBezTo>
-                <a:cubicBezTo>
-                  <a:pt x="781" y="968"/>
-                  <a:pt x="781" y="968"/>
-                  <a:pt x="781" y="968"/>
-                </a:cubicBezTo>
-                <a:cubicBezTo>
-                  <a:pt x="810" y="968"/>
-                  <a:pt x="838" y="952"/>
-                  <a:pt x="852" y="926"/>
-                </a:cubicBezTo>
-                <a:cubicBezTo>
-                  <a:pt x="1084" y="525"/>
-                  <a:pt x="1084" y="525"/>
-                  <a:pt x="1084" y="525"/>
-                </a:cubicBezTo>
-                <a:cubicBezTo>
-                  <a:pt x="1099" y="500"/>
-                  <a:pt x="1099" y="468"/>
-                  <a:pt x="1084" y="443"/>
-                </a:cubicBezTo>
-                <a:cubicBezTo>
-                  <a:pt x="852" y="42"/>
-                  <a:pt x="852" y="42"/>
-                  <a:pt x="852" y="42"/>
-                </a:cubicBezTo>
-                <a:cubicBezTo>
-                  <a:pt x="838" y="16"/>
-                  <a:pt x="810" y="0"/>
-                  <a:pt x="781" y="0"/>
-                </a:cubicBezTo>
-                <a:close/>
-              </a:path>
-            </a:pathLst>
-          </a:custGeom>
-          <a:noFill/>
-          <a:ln w="50800" cap="flat">
-            <a:solidFill>
-              <a:schemeClr val="tx1"/>
-            </a:solidFill>
-            <a:prstDash val="solid"/>
-            <a:miter lim="800000"/>
-            <a:headEnd/>
-            <a:tailEnd/>
-          </a:ln>
-        </p:spPr>
-        <p:txBody>
-          <a:bodyPr vert="horz" wrap="square" lIns="91440" tIns="45720" rIns="91440" bIns="45720" numCol="1" anchor="t" anchorCtr="0" compatLnSpc="1">
-            <a:prstTxWarp prst="textNoShape">
-              <a:avLst/>
-            </a:prstTxWarp>
-          </a:bodyPr>
-          <a:lstStyle/>
-          <a:p>
-            <a:endParaRPr lang="en-US" dirty="0"/>
-          </a:p>
-        </p:txBody>
-      </p:sp>
-      <p:sp>
-        <p:nvSpPr>
-          <p:cNvPr id="39" name="Freeform: Shape 38">
-            <a:extLst>
-              <a:ext uri="{FF2B5EF4-FFF2-40B4-BE49-F238E27FC236}">
-                <a16:creationId xmlns:a16="http://schemas.microsoft.com/office/drawing/2014/main" id="{0DB06EAB-7D8C-403A-86C5-B5FD79A13650}"/>
-              </a:ext>
-              <a:ext uri="{C183D7F6-B498-43B3-948B-1728B52AA6E4}">
-                <adec:decorative xmlns:adec="http://schemas.microsoft.com/office/drawing/2017/decorative" val="1"/>
-              </a:ext>
-            </a:extLst>
-          </p:cNvPr>
-          <p:cNvSpPr>
-            <a:spLocks noGrp="1" noRot="1" noChangeAspect="1" noMove="1" noResize="1" noEditPoints="1" noAdjustHandles="1" noChangeArrowheads="1" noChangeShapeType="1" noTextEdit="1"/>
-          </p:cNvSpPr>
-          <p:nvPr>
-            <p:extLst>
-              <p:ext uri="{386F3935-93C4-4BCD-93E2-E3B085C9AB24}">
-                <p16:designElem xmlns:p16="http://schemas.microsoft.com/office/powerpoint/2015/main" val="1"/>
-              </p:ext>
-            </p:extLst>
-          </p:nvPr>
-        </p:nvSpPr>
-        <p:spPr>
-          <a:xfrm>
-            <a:off x="4542865" y="634058"/>
-            <a:ext cx="3154669" cy="2796247"/>
-          </a:xfrm>
-          <a:custGeom>
-            <a:avLst/>
-            <a:gdLst>
-              <a:gd name="connsiteX0" fmla="*/ 853538 w 2991693"/>
-              <a:gd name="connsiteY0" fmla="*/ 0 h 2651787"/>
-              <a:gd name="connsiteX1" fmla="*/ 2141030 w 2991693"/>
-              <a:gd name="connsiteY1" fmla="*/ 0 h 2651787"/>
-              <a:gd name="connsiteX2" fmla="*/ 2324957 w 2991693"/>
-              <a:gd name="connsiteY2" fmla="*/ 103466 h 2651787"/>
-              <a:gd name="connsiteX3" fmla="*/ 2968702 w 2991693"/>
-              <a:gd name="connsiteY3" fmla="*/ 1218596 h 2651787"/>
-              <a:gd name="connsiteX4" fmla="*/ 2968702 w 2991693"/>
-              <a:gd name="connsiteY4" fmla="*/ 1433192 h 2651787"/>
-              <a:gd name="connsiteX5" fmla="*/ 2324957 w 2991693"/>
-              <a:gd name="connsiteY5" fmla="*/ 2548321 h 2651787"/>
-              <a:gd name="connsiteX6" fmla="*/ 2141030 w 2991693"/>
-              <a:gd name="connsiteY6" fmla="*/ 2651787 h 2651787"/>
-              <a:gd name="connsiteX7" fmla="*/ 853538 w 2991693"/>
-              <a:gd name="connsiteY7" fmla="*/ 2651787 h 2651787"/>
-              <a:gd name="connsiteX8" fmla="*/ 669612 w 2991693"/>
-              <a:gd name="connsiteY8" fmla="*/ 2548321 h 2651787"/>
-              <a:gd name="connsiteX9" fmla="*/ 25866 w 2991693"/>
-              <a:gd name="connsiteY9" fmla="*/ 1433192 h 2651787"/>
-              <a:gd name="connsiteX10" fmla="*/ 25866 w 2991693"/>
-              <a:gd name="connsiteY10" fmla="*/ 1218596 h 2651787"/>
-              <a:gd name="connsiteX11" fmla="*/ 669612 w 2991693"/>
-              <a:gd name="connsiteY11" fmla="*/ 103466 h 2651787"/>
-              <a:gd name="connsiteX12" fmla="*/ 853538 w 2991693"/>
-              <a:gd name="connsiteY12" fmla="*/ 0 h 2651787"/>
-            </a:gdLst>
-            <a:ahLst/>
-            <a:cxnLst>
-              <a:cxn ang="0">
-                <a:pos x="connsiteX0" y="connsiteY0"/>
-              </a:cxn>
-              <a:cxn ang="0">
-                <a:pos x="connsiteX1" y="connsiteY1"/>
-              </a:cxn>
-              <a:cxn ang="0">
-                <a:pos x="connsiteX2" y="connsiteY2"/>
-              </a:cxn>
-              <a:cxn ang="0">
-                <a:pos x="connsiteX3" y="connsiteY3"/>
-              </a:cxn>
-              <a:cxn ang="0">
-                <a:pos x="connsiteX4" y="connsiteY4"/>
-              </a:cxn>
-              <a:cxn ang="0">
-                <a:pos x="connsiteX5" y="connsiteY5"/>
-              </a:cxn>
-              <a:cxn ang="0">
-                <a:pos x="connsiteX6" y="connsiteY6"/>
-              </a:cxn>
-              <a:cxn ang="0">
-                <a:pos x="connsiteX7" y="connsiteY7"/>
-              </a:cxn>
-              <a:cxn ang="0">
-                <a:pos x="connsiteX8" y="connsiteY8"/>
-              </a:cxn>
-              <a:cxn ang="0">
-                <a:pos x="connsiteX9" y="connsiteY9"/>
-              </a:cxn>
-              <a:cxn ang="0">
-                <a:pos x="connsiteX10" y="connsiteY10"/>
-              </a:cxn>
-              <a:cxn ang="0">
-                <a:pos x="connsiteX11" y="connsiteY11"/>
-              </a:cxn>
-              <a:cxn ang="0">
-                <a:pos x="connsiteX12" y="connsiteY12"/>
-              </a:cxn>
-            </a:cxnLst>
-            <a:rect l="l" t="t" r="r" b="b"/>
-            <a:pathLst>
-              <a:path w="2991693" h="2651787">
-                <a:moveTo>
-                  <a:pt x="853538" y="0"/>
-                </a:moveTo>
-                <a:cubicBezTo>
-                  <a:pt x="2141030" y="0"/>
-                  <a:pt x="2141030" y="0"/>
-                  <a:pt x="2141030" y="0"/>
-                </a:cubicBezTo>
-                <a:cubicBezTo>
-                  <a:pt x="2206170" y="0"/>
-                  <a:pt x="2290471" y="45985"/>
-                  <a:pt x="2324957" y="103466"/>
-                </a:cubicBezTo>
-                <a:cubicBezTo>
-                  <a:pt x="2968702" y="1218596"/>
-                  <a:pt x="2968702" y="1218596"/>
-                  <a:pt x="2968702" y="1218596"/>
-                </a:cubicBezTo>
-                <a:cubicBezTo>
-                  <a:pt x="2999357" y="1279909"/>
-                  <a:pt x="2999357" y="1371878"/>
-                  <a:pt x="2968702" y="1433192"/>
-                </a:cubicBezTo>
-                <a:cubicBezTo>
-                  <a:pt x="2324957" y="2548321"/>
-                  <a:pt x="2324957" y="2548321"/>
-                  <a:pt x="2324957" y="2548321"/>
-                </a:cubicBezTo>
-                <a:cubicBezTo>
-                  <a:pt x="2290471" y="2605803"/>
-                  <a:pt x="2206170" y="2651787"/>
-                  <a:pt x="2141030" y="2651787"/>
-                </a:cubicBezTo>
-                <a:lnTo>
-                  <a:pt x="853538" y="2651787"/>
-                </a:lnTo>
-                <a:cubicBezTo>
-                  <a:pt x="784566" y="2651787"/>
-                  <a:pt x="700266" y="2605803"/>
-                  <a:pt x="669612" y="2548321"/>
-                </a:cubicBezTo>
-                <a:cubicBezTo>
-                  <a:pt x="25866" y="1433192"/>
-                  <a:pt x="25866" y="1433192"/>
-                  <a:pt x="25866" y="1433192"/>
-                </a:cubicBezTo>
-                <a:cubicBezTo>
-                  <a:pt x="-8621" y="1371878"/>
-                  <a:pt x="-8621" y="1279909"/>
-                  <a:pt x="25866" y="1218596"/>
-                </a:cubicBezTo>
-                <a:cubicBezTo>
-                  <a:pt x="669612" y="103466"/>
-                  <a:pt x="669612" y="103466"/>
-                  <a:pt x="669612" y="103466"/>
-                </a:cubicBezTo>
-                <a:cubicBezTo>
-                  <a:pt x="700266" y="45985"/>
-                  <a:pt x="784566" y="0"/>
-                  <a:pt x="853538" y="0"/>
-                </a:cubicBezTo>
-                <a:close/>
-              </a:path>
-            </a:pathLst>
-          </a:custGeom>
-          <a:noFill/>
-          <a:ln w="50800" cap="flat">
-            <a:solidFill>
-              <a:schemeClr val="tx1"/>
-            </a:solidFill>
-            <a:prstDash val="solid"/>
-            <a:miter lim="800000"/>
-            <a:headEnd/>
-            <a:tailEnd/>
-          </a:ln>
-        </p:spPr>
-        <p:txBody>
-          <a:bodyPr vert="horz" wrap="square" lIns="91440" tIns="45720" rIns="91440" bIns="45720" numCol="1" anchor="t" anchorCtr="0" compatLnSpc="1">
-            <a:prstTxWarp prst="textNoShape">
-              <a:avLst/>
-            </a:prstTxWarp>
-          </a:bodyPr>
-          <a:lstStyle/>
-          <a:p>
-            <a:endParaRPr lang="en-US" dirty="0">
-              <a:solidFill>
-                <a:schemeClr val="tx1"/>
-              </a:solidFill>
-            </a:endParaRPr>
-          </a:p>
-        </p:txBody>
-      </p:sp>
-      <p:pic>
-        <p:nvPicPr>
-          <p:cNvPr id="7" name="Imagen 6">
-            <a:extLst>
-              <a:ext uri="{FF2B5EF4-FFF2-40B4-BE49-F238E27FC236}">
-                <a16:creationId xmlns:a16="http://schemas.microsoft.com/office/drawing/2014/main" id="{26481F29-5374-3581-C19E-67741DD96B8D}"/>
-              </a:ext>
-            </a:extLst>
-          </p:cNvPr>
-          <p:cNvPicPr>
-            <a:picLocks noChangeAspect="1"/>
-          </p:cNvPicPr>
-          <p:nvPr/>
-        </p:nvPicPr>
-        <p:blipFill>
-          <a:blip r:embed="rId2"/>
-          <a:stretch>
-            <a:fillRect/>
-          </a:stretch>
-        </p:blipFill>
-        <p:spPr>
-          <a:xfrm>
-            <a:off x="191998" y="564315"/>
-            <a:ext cx="11559416" cy="5567544"/>
-          </a:xfrm>
-          <a:prstGeom prst="rect">
-            <a:avLst/>
-          </a:prstGeom>
-        </p:spPr>
-      </p:pic>
-    </p:spTree>
-    <p:extLst>
-      <p:ext uri="{BB962C8B-B14F-4D97-AF65-F5344CB8AC3E}">
-        <p14:creationId xmlns:p14="http://schemas.microsoft.com/office/powerpoint/2010/main" val="207170459"/>
-      </p:ext>
-    </p:extLst>
-  </p:cSld>
-  <p:clrMapOvr>
-    <a:masterClrMapping/>
-  </p:clrMapOvr>
-</p:sld>
-</file>
-
-<file path=ppt/slides/slide5.xml><?xml version="1.0" encoding="utf-8"?>
 <p:sld xmlns:a="http://schemas.openxmlformats.org/drawingml/2006/main" xmlns:r="http://schemas.openxmlformats.org/officeDocument/2006/relationships" xmlns:p="http://schemas.openxmlformats.org/presentationml/2006/main">
   <p:cSld>
     <p:bg>
@@ -16413,7 +13289,7 @@
 </p:sld>
 </file>
 
-<file path=ppt/slides/slide6.xml><?xml version="1.0" encoding="utf-8"?>
+<file path=ppt/slides/slide3.xml><?xml version="1.0" encoding="utf-8"?>
 <p:sld xmlns:a="http://schemas.openxmlformats.org/drawingml/2006/main" xmlns:r="http://schemas.openxmlformats.org/officeDocument/2006/relationships" xmlns:p="http://schemas.openxmlformats.org/presentationml/2006/main">
   <p:cSld>
     <p:bg>
@@ -17335,7 +14211,7 @@
 </p:sld>
 </file>
 
-<file path=ppt/slides/slide7.xml><?xml version="1.0" encoding="utf-8"?>
+<file path=ppt/slides/slide4.xml><?xml version="1.0" encoding="utf-8"?>
 <p:sld xmlns:a="http://schemas.openxmlformats.org/drawingml/2006/main" xmlns:r="http://schemas.openxmlformats.org/officeDocument/2006/relationships" xmlns:p="http://schemas.openxmlformats.org/presentationml/2006/main">
   <p:cSld>
     <p:bg>
@@ -18728,7 +15604,7 @@
 </p:sld>
 </file>
 
-<file path=ppt/slides/slide8.xml><?xml version="1.0" encoding="utf-8"?>
+<file path=ppt/slides/slide5.xml><?xml version="1.0" encoding="utf-8"?>
 <p:sld xmlns:a="http://schemas.openxmlformats.org/drawingml/2006/main" xmlns:r="http://schemas.openxmlformats.org/officeDocument/2006/relationships" xmlns:p="http://schemas.openxmlformats.org/presentationml/2006/main">
   <p:cSld>
     <p:bg>
@@ -19171,8 +16047,85 @@
         </p:blipFill>
         <p:spPr bwMode="auto">
           <a:xfrm>
-            <a:off x="1109098" y="2290936"/>
-            <a:ext cx="9961612" cy="3959352"/>
+            <a:off x="6387054" y="265039"/>
+            <a:ext cx="4870493" cy="1935831"/>
+          </a:xfrm>
+          <a:prstGeom prst="rect">
+            <a:avLst/>
+          </a:prstGeom>
+          <a:noFill/>
+          <a:extLst>
+            <a:ext uri="{909E8E84-426E-40DD-AFC4-6F175D3DCCD1}">
+              <a14:hiddenFill xmlns:a14="http://schemas.microsoft.com/office/drawing/2010/main">
+                <a:solidFill>
+                  <a:srgbClr val="FFFFFF"/>
+                </a:solidFill>
+              </a14:hiddenFill>
+            </a:ext>
+          </a:extLst>
+        </p:spPr>
+      </p:pic>
+      <p:pic>
+        <p:nvPicPr>
+          <p:cNvPr id="4" name="Imagen 3">
+            <a:extLst>
+              <a:ext uri="{FF2B5EF4-FFF2-40B4-BE49-F238E27FC236}">
+                <a16:creationId xmlns:a16="http://schemas.microsoft.com/office/drawing/2014/main" id="{1A380B46-4E4C-CB0E-6C30-C5B841D5B9C0}"/>
+              </a:ext>
+            </a:extLst>
+          </p:cNvPr>
+          <p:cNvPicPr>
+            <a:picLocks noChangeAspect="1"/>
+          </p:cNvPicPr>
+          <p:nvPr/>
+        </p:nvPicPr>
+        <p:blipFill>
+          <a:blip r:embed="rId3"/>
+          <a:stretch>
+            <a:fillRect/>
+          </a:stretch>
+        </p:blipFill>
+        <p:spPr>
+          <a:xfrm>
+            <a:off x="1547510" y="2321220"/>
+            <a:ext cx="9679088" cy="4352480"/>
+          </a:xfrm>
+          <a:prstGeom prst="rect">
+            <a:avLst/>
+          </a:prstGeom>
+        </p:spPr>
+      </p:pic>
+      <p:pic>
+        <p:nvPicPr>
+          <p:cNvPr id="1026" name="Picture 2">
+            <a:extLst>
+              <a:ext uri="{FF2B5EF4-FFF2-40B4-BE49-F238E27FC236}">
+                <a16:creationId xmlns:a16="http://schemas.microsoft.com/office/drawing/2014/main" id="{E1A66E1C-F882-E42F-79E9-75C7C2AB787D}"/>
+              </a:ext>
+            </a:extLst>
+          </p:cNvPr>
+          <p:cNvPicPr>
+            <a:picLocks noChangeAspect="1" noChangeArrowheads="1"/>
+          </p:cNvPicPr>
+          <p:nvPr/>
+        </p:nvPicPr>
+        <p:blipFill>
+          <a:blip r:embed="rId4">
+            <a:extLst>
+              <a:ext uri="{28A0092B-C50C-407E-A947-70E740481C1C}">
+                <a14:useLocalDpi xmlns:a14="http://schemas.microsoft.com/office/drawing/2010/main" val="0"/>
+              </a:ext>
+            </a:extLst>
+          </a:blip>
+          <a:srcRect/>
+          <a:stretch>
+            <a:fillRect/>
+          </a:stretch>
+        </p:blipFill>
+        <p:spPr bwMode="auto">
+          <a:xfrm>
+            <a:off x="4552758" y="1517252"/>
+            <a:ext cx="1800225" cy="369187"/>
           </a:xfrm>
           <a:prstGeom prst="rect">
             <a:avLst/>
@@ -19202,7 +16155,7 @@
 </p:sld>
 </file>
 
-<file path=ppt/slides/slide9.xml><?xml version="1.0" encoding="utf-8"?>
+<file path=ppt/slides/slide6.xml><?xml version="1.0" encoding="utf-8"?>
 <p:sld xmlns:a="http://schemas.openxmlformats.org/drawingml/2006/main" xmlns:r="http://schemas.openxmlformats.org/officeDocument/2006/relationships" xmlns:p="http://schemas.openxmlformats.org/presentationml/2006/main">
   <p:cSld>
     <p:bg>
@@ -20144,6 +17097,924 @@
 </p:sld>
 </file>
 
+<file path=ppt/slides/slide7.xml><?xml version="1.0" encoding="utf-8"?>
+<p:sld xmlns:a="http://schemas.openxmlformats.org/drawingml/2006/main" xmlns:r="http://schemas.openxmlformats.org/officeDocument/2006/relationships" xmlns:p="http://schemas.openxmlformats.org/presentationml/2006/main">
+  <p:cSld>
+    <p:bg>
+      <p:bgPr>
+        <a:solidFill>
+          <a:schemeClr val="bg1"/>
+        </a:solidFill>
+        <a:effectLst/>
+      </p:bgPr>
+    </p:bg>
+    <p:spTree>
+      <p:nvGrpSpPr>
+        <p:cNvPr id="1" name=""/>
+        <p:cNvGrpSpPr/>
+        <p:nvPr/>
+      </p:nvGrpSpPr>
+      <p:grpSpPr>
+        <a:xfrm>
+          <a:off x="0" y="0"/>
+          <a:ext cx="0" cy="0"/>
+          <a:chOff x="0" y="0"/>
+          <a:chExt cx="0" cy="0"/>
+        </a:xfrm>
+      </p:grpSpPr>
+      <p:pic>
+        <p:nvPicPr>
+          <p:cNvPr id="5122" name="Picture 2" descr="Web App Development Company, Web App Development Services">
+            <a:extLst>
+              <a:ext uri="{FF2B5EF4-FFF2-40B4-BE49-F238E27FC236}">
+                <a16:creationId xmlns:a16="http://schemas.microsoft.com/office/drawing/2014/main" id="{95275804-447F-45D7-A6AB-D5BC8B4F3358}"/>
+              </a:ext>
+            </a:extLst>
+          </p:cNvPr>
+          <p:cNvPicPr>
+            <a:picLocks noChangeAspect="1" noChangeArrowheads="1"/>
+          </p:cNvPicPr>
+          <p:nvPr/>
+        </p:nvPicPr>
+        <p:blipFill rotWithShape="1">
+          <a:blip r:embed="rId2">
+            <a:alphaModFix amt="40000"/>
+            <a:extLst>
+              <a:ext uri="{28A0092B-C50C-407E-A947-70E740481C1C}">
+                <a14:useLocalDpi xmlns:a14="http://schemas.microsoft.com/office/drawing/2010/main" val="0"/>
+              </a:ext>
+            </a:extLst>
+          </a:blip>
+          <a:srcRect r="1779" b="1"/>
+          <a:stretch/>
+        </p:blipFill>
+        <p:spPr bwMode="auto">
+          <a:xfrm>
+            <a:off x="20" y="10"/>
+            <a:ext cx="12191980" cy="6857990"/>
+          </a:xfrm>
+          <a:prstGeom prst="rect">
+            <a:avLst/>
+          </a:prstGeom>
+          <a:noFill/>
+          <a:extLst>
+            <a:ext uri="{909E8E84-426E-40DD-AFC4-6F175D3DCCD1}">
+              <a14:hiddenFill xmlns:a14="http://schemas.microsoft.com/office/drawing/2010/main">
+                <a:solidFill>
+                  <a:srgbClr val="FFFFFF"/>
+                </a:solidFill>
+              </a14:hiddenFill>
+            </a:ext>
+          </a:extLst>
+        </p:spPr>
+      </p:pic>
+      <p:sp>
+        <p:nvSpPr>
+          <p:cNvPr id="2" name="Título 1">
+            <a:extLst>
+              <a:ext uri="{FF2B5EF4-FFF2-40B4-BE49-F238E27FC236}">
+                <a16:creationId xmlns:a16="http://schemas.microsoft.com/office/drawing/2014/main" id="{1B821B62-3517-478E-A60E-C478029540AB}"/>
+              </a:ext>
+            </a:extLst>
+          </p:cNvPr>
+          <p:cNvSpPr>
+            <a:spLocks noGrp="1"/>
+          </p:cNvSpPr>
+          <p:nvPr>
+            <p:ph type="title"/>
+          </p:nvPr>
+        </p:nvSpPr>
+        <p:spPr>
+          <a:xfrm>
+            <a:off x="1621366" y="583755"/>
+            <a:ext cx="8949267" cy="2193269"/>
+          </a:xfrm>
+        </p:spPr>
+        <p:txBody>
+          <a:bodyPr vert="horz" lIns="91440" tIns="45720" rIns="91440" bIns="45720" rtlCol="0" anchor="b">
+            <a:normAutofit/>
+          </a:bodyPr>
+          <a:lstStyle/>
+          <a:p>
+            <a:r>
+              <a:rPr lang="en-US" sz="11500" dirty="0">
+                <a:ln w="22225">
+                  <a:solidFill>
+                    <a:schemeClr val="tx1"/>
+                  </a:solidFill>
+                  <a:miter lim="800000"/>
+                </a:ln>
+                <a:noFill/>
+              </a:rPr>
+              <a:t>Aplicativo web</a:t>
+            </a:r>
+          </a:p>
+        </p:txBody>
+      </p:sp>
+      <p:sp>
+        <p:nvSpPr>
+          <p:cNvPr id="3" name="Título 1">
+            <a:extLst>
+              <a:ext uri="{FF2B5EF4-FFF2-40B4-BE49-F238E27FC236}">
+                <a16:creationId xmlns:a16="http://schemas.microsoft.com/office/drawing/2014/main" id="{7C120193-6849-CE6D-6EBA-B24862DD107E}"/>
+              </a:ext>
+            </a:extLst>
+          </p:cNvPr>
+          <p:cNvSpPr txBox="1">
+            <a:spLocks/>
+          </p:cNvSpPr>
+          <p:nvPr/>
+        </p:nvSpPr>
+        <p:spPr>
+          <a:xfrm>
+            <a:off x="2303156" y="2777024"/>
+            <a:ext cx="8949267" cy="2193269"/>
+          </a:xfrm>
+          <a:prstGeom prst="rect">
+            <a:avLst/>
+          </a:prstGeom>
+        </p:spPr>
+        <p:txBody>
+          <a:bodyPr vert="horz" lIns="91440" tIns="45720" rIns="91440" bIns="45720" rtlCol="0" anchor="b">
+            <a:noAutofit/>
+          </a:bodyPr>
+          <a:lstStyle>
+            <a:lvl1pPr algn="l" defTabSz="914400" rtl="0" eaLnBrk="1" latinLnBrk="0" hangingPunct="1">
+              <a:lnSpc>
+                <a:spcPct val="90000"/>
+              </a:lnSpc>
+              <a:spcBef>
+                <a:spcPct val="0"/>
+              </a:spcBef>
+              <a:buNone/>
+              <a:defRPr sz="4400" kern="1200">
+                <a:solidFill>
+                  <a:schemeClr val="tx1"/>
+                </a:solidFill>
+                <a:latin typeface="+mj-lt"/>
+                <a:ea typeface="+mj-ea"/>
+                <a:cs typeface="+mj-cs"/>
+              </a:defRPr>
+            </a:lvl1pPr>
+          </a:lstStyle>
+          <a:p>
+            <a:r>
+              <a:rPr lang="en-US" sz="4800" dirty="0">
+                <a:ln w="22225">
+                  <a:solidFill>
+                    <a:schemeClr val="tx1"/>
+                  </a:solidFill>
+                  <a:miter lim="800000"/>
+                </a:ln>
+                <a:noFill/>
+              </a:rPr>
+              <a:t>Desarrollo e implementaciòn</a:t>
+            </a:r>
+          </a:p>
+        </p:txBody>
+      </p:sp>
+    </p:spTree>
+    <p:extLst>
+      <p:ext uri="{BB962C8B-B14F-4D97-AF65-F5344CB8AC3E}">
+        <p14:creationId xmlns:p14="http://schemas.microsoft.com/office/powerpoint/2010/main" val="767735173"/>
+      </p:ext>
+    </p:extLst>
+  </p:cSld>
+  <p:clrMapOvr>
+    <a:overrideClrMapping bg1="dk1" tx1="lt1" bg2="dk2" tx2="lt2" accent1="accent1" accent2="accent2" accent3="accent3" accent4="accent4" accent5="accent5" accent6="accent6" hlink="hlink" folHlink="folHlink"/>
+  </p:clrMapOvr>
+  <p:timing>
+    <p:tnLst>
+      <p:par>
+        <p:cTn id="1" dur="indefinite" restart="never" nodeType="tmRoot">
+          <p:childTnLst>
+            <p:seq concurrent="1" nextAc="seek">
+              <p:cTn id="2" dur="indefinite" nodeType="mainSeq">
+                <p:childTnLst>
+                  <p:par>
+                    <p:cTn id="3" fill="hold">
+                      <p:stCondLst>
+                        <p:cond delay="indefinite"/>
+                        <p:cond evt="onBegin" delay="0">
+                          <p:tn val="2"/>
+                        </p:cond>
+                      </p:stCondLst>
+                      <p:childTnLst>
+                        <p:par>
+                          <p:cTn id="4" fill="hold">
+                            <p:stCondLst>
+                              <p:cond delay="0"/>
+                            </p:stCondLst>
+                            <p:childTnLst>
+                              <p:par>
+                                <p:cTn id="5" presetID="10" presetClass="entr" presetSubtype="0" fill="hold" grpId="0" nodeType="withEffect">
+                                  <p:stCondLst>
+                                    <p:cond delay="1000"/>
+                                  </p:stCondLst>
+                                  <p:iterate type="lt">
+                                    <p:tmPct val="10000"/>
+                                  </p:iterate>
+                                  <p:childTnLst>
+                                    <p:set>
+                                      <p:cBhvr>
+                                        <p:cTn id="6" dur="1" fill="hold">
+                                          <p:stCondLst>
+                                            <p:cond delay="0"/>
+                                          </p:stCondLst>
+                                        </p:cTn>
+                                        <p:tgtEl>
+                                          <p:spTgt spid="2"/>
+                                        </p:tgtEl>
+                                        <p:attrNameLst>
+                                          <p:attrName>style.visibility</p:attrName>
+                                        </p:attrNameLst>
+                                      </p:cBhvr>
+                                      <p:to>
+                                        <p:strVal val="visible"/>
+                                      </p:to>
+                                    </p:set>
+                                    <p:animEffect transition="in" filter="fade">
+                                      <p:cBhvr>
+                                        <p:cTn id="7" dur="400"/>
+                                        <p:tgtEl>
+                                          <p:spTgt spid="2"/>
+                                        </p:tgtEl>
+                                      </p:cBhvr>
+                                    </p:animEffect>
+                                  </p:childTnLst>
+                                </p:cTn>
+                              </p:par>
+                              <p:par>
+                                <p:cTn id="8" presetID="10" presetClass="entr" presetSubtype="0" fill="hold" grpId="0" nodeType="withEffect">
+                                  <p:stCondLst>
+                                    <p:cond delay="1000"/>
+                                  </p:stCondLst>
+                                  <p:iterate type="lt">
+                                    <p:tmPct val="10000"/>
+                                  </p:iterate>
+                                  <p:childTnLst>
+                                    <p:set>
+                                      <p:cBhvr>
+                                        <p:cTn id="9" dur="1" fill="hold">
+                                          <p:stCondLst>
+                                            <p:cond delay="0"/>
+                                          </p:stCondLst>
+                                        </p:cTn>
+                                        <p:tgtEl>
+                                          <p:spTgt spid="3"/>
+                                        </p:tgtEl>
+                                        <p:attrNameLst>
+                                          <p:attrName>style.visibility</p:attrName>
+                                        </p:attrNameLst>
+                                      </p:cBhvr>
+                                      <p:to>
+                                        <p:strVal val="visible"/>
+                                      </p:to>
+                                    </p:set>
+                                    <p:animEffect transition="in" filter="fade">
+                                      <p:cBhvr>
+                                        <p:cTn id="10" dur="400"/>
+                                        <p:tgtEl>
+                                          <p:spTgt spid="3"/>
+                                        </p:tgtEl>
+                                      </p:cBhvr>
+                                    </p:animEffect>
+                                  </p:childTnLst>
+                                </p:cTn>
+                              </p:par>
+                            </p:childTnLst>
+                          </p:cTn>
+                        </p:par>
+                      </p:childTnLst>
+                    </p:cTn>
+                  </p:par>
+                </p:childTnLst>
+              </p:cTn>
+              <p:prevCondLst>
+                <p:cond evt="onPrev" delay="0">
+                  <p:tgtEl>
+                    <p:sldTgt/>
+                  </p:tgtEl>
+                </p:cond>
+              </p:prevCondLst>
+              <p:nextCondLst>
+                <p:cond evt="onNext" delay="0">
+                  <p:tgtEl>
+                    <p:sldTgt/>
+                  </p:tgtEl>
+                </p:cond>
+              </p:nextCondLst>
+            </p:seq>
+          </p:childTnLst>
+        </p:cTn>
+      </p:par>
+    </p:tnLst>
+    <p:bldLst>
+      <p:bldP spid="2" grpId="0"/>
+      <p:bldP spid="3" grpId="0"/>
+    </p:bldLst>
+  </p:timing>
+</p:sld>
+</file>
+
+<file path=ppt/slides/slide8.xml><?xml version="1.0" encoding="utf-8"?>
+<p:sld xmlns:a="http://schemas.openxmlformats.org/drawingml/2006/main" xmlns:r="http://schemas.openxmlformats.org/officeDocument/2006/relationships" xmlns:p="http://schemas.openxmlformats.org/presentationml/2006/main">
+  <p:cSld>
+    <p:bg>
+      <p:bgPr>
+        <a:solidFill>
+          <a:schemeClr val="bg1"/>
+        </a:solidFill>
+        <a:effectLst/>
+      </p:bgPr>
+    </p:bg>
+    <p:spTree>
+      <p:nvGrpSpPr>
+        <p:cNvPr id="1" name=""/>
+        <p:cNvGrpSpPr/>
+        <p:nvPr/>
+      </p:nvGrpSpPr>
+      <p:grpSpPr>
+        <a:xfrm>
+          <a:off x="0" y="0"/>
+          <a:ext cx="0" cy="0"/>
+          <a:chOff x="0" y="0"/>
+          <a:chExt cx="0" cy="0"/>
+        </a:xfrm>
+      </p:grpSpPr>
+      <p:pic>
+        <p:nvPicPr>
+          <p:cNvPr id="1026" name="Picture 2" descr="Qué es Hosting y Dominio? | Magazine">
+            <a:extLst>
+              <a:ext uri="{FF2B5EF4-FFF2-40B4-BE49-F238E27FC236}">
+                <a16:creationId xmlns:a16="http://schemas.microsoft.com/office/drawing/2014/main" id="{F22A3745-61E3-602A-4178-C886D8F35FC5}"/>
+              </a:ext>
+            </a:extLst>
+          </p:cNvPr>
+          <p:cNvPicPr>
+            <a:picLocks noChangeAspect="1" noChangeArrowheads="1"/>
+          </p:cNvPicPr>
+          <p:nvPr/>
+        </p:nvPicPr>
+        <p:blipFill>
+          <a:blip r:embed="rId2">
+            <a:extLst>
+              <a:ext uri="{28A0092B-C50C-407E-A947-70E740481C1C}">
+                <a14:useLocalDpi xmlns:a14="http://schemas.microsoft.com/office/drawing/2010/main" val="0"/>
+              </a:ext>
+            </a:extLst>
+          </a:blip>
+          <a:srcRect/>
+          <a:stretch>
+            <a:fillRect/>
+          </a:stretch>
+        </p:blipFill>
+        <p:spPr bwMode="auto">
+          <a:xfrm>
+            <a:off x="0" y="238358"/>
+            <a:ext cx="12137740" cy="6094413"/>
+          </a:xfrm>
+          <a:prstGeom prst="rect">
+            <a:avLst/>
+          </a:prstGeom>
+          <a:noFill/>
+          <a:extLst>
+            <a:ext uri="{909E8E84-426E-40DD-AFC4-6F175D3DCCD1}">
+              <a14:hiddenFill xmlns:a14="http://schemas.microsoft.com/office/drawing/2010/main">
+                <a:solidFill>
+                  <a:srgbClr val="FFFFFF"/>
+                </a:solidFill>
+              </a14:hiddenFill>
+            </a:ext>
+          </a:extLst>
+        </p:spPr>
+      </p:pic>
+      <p:sp>
+        <p:nvSpPr>
+          <p:cNvPr id="2" name="Título 1">
+            <a:extLst>
+              <a:ext uri="{FF2B5EF4-FFF2-40B4-BE49-F238E27FC236}">
+                <a16:creationId xmlns:a16="http://schemas.microsoft.com/office/drawing/2014/main" id="{1B821B62-3517-478E-A60E-C478029540AB}"/>
+              </a:ext>
+            </a:extLst>
+          </p:cNvPr>
+          <p:cNvSpPr>
+            <a:spLocks noGrp="1"/>
+          </p:cNvSpPr>
+          <p:nvPr>
+            <p:ph type="title"/>
+          </p:nvPr>
+        </p:nvSpPr>
+        <p:spPr>
+          <a:xfrm>
+            <a:off x="3781861" y="72768"/>
+            <a:ext cx="4169834" cy="1745033"/>
+          </a:xfrm>
+        </p:spPr>
+        <p:txBody>
+          <a:bodyPr vert="horz" lIns="91440" tIns="45720" rIns="91440" bIns="45720" rtlCol="0" anchor="b">
+            <a:normAutofit fontScale="90000"/>
+          </a:bodyPr>
+          <a:lstStyle/>
+          <a:p>
+            <a:r>
+              <a:rPr lang="es-EC" sz="11500" dirty="0">
+                <a:ln w="22225">
+                  <a:solidFill>
+                    <a:schemeClr val="tx1"/>
+                  </a:solidFill>
+                  <a:miter lim="800000"/>
+                </a:ln>
+                <a:noFill/>
+              </a:rPr>
+              <a:t>Valores</a:t>
+            </a:r>
+          </a:p>
+        </p:txBody>
+      </p:sp>
+      <p:sp>
+        <p:nvSpPr>
+          <p:cNvPr id="3" name="Título 1">
+            <a:extLst>
+              <a:ext uri="{FF2B5EF4-FFF2-40B4-BE49-F238E27FC236}">
+                <a16:creationId xmlns:a16="http://schemas.microsoft.com/office/drawing/2014/main" id="{7C120193-6849-CE6D-6EBA-B24862DD107E}"/>
+              </a:ext>
+            </a:extLst>
+          </p:cNvPr>
+          <p:cNvSpPr txBox="1">
+            <a:spLocks/>
+          </p:cNvSpPr>
+          <p:nvPr/>
+        </p:nvSpPr>
+        <p:spPr>
+          <a:xfrm>
+            <a:off x="904662" y="3781071"/>
+            <a:ext cx="8949267" cy="2193269"/>
+          </a:xfrm>
+          <a:prstGeom prst="rect">
+            <a:avLst/>
+          </a:prstGeom>
+        </p:spPr>
+        <p:txBody>
+          <a:bodyPr vert="horz" lIns="91440" tIns="45720" rIns="91440" bIns="45720" rtlCol="0" anchor="b">
+            <a:noAutofit/>
+          </a:bodyPr>
+          <a:lstStyle>
+            <a:lvl1pPr algn="l" defTabSz="914400" rtl="0" eaLnBrk="1" latinLnBrk="0" hangingPunct="1">
+              <a:lnSpc>
+                <a:spcPct val="90000"/>
+              </a:lnSpc>
+              <a:spcBef>
+                <a:spcPct val="0"/>
+              </a:spcBef>
+              <a:buNone/>
+              <a:defRPr sz="4400" kern="1200">
+                <a:solidFill>
+                  <a:schemeClr val="tx1"/>
+                </a:solidFill>
+                <a:latin typeface="+mj-lt"/>
+                <a:ea typeface="+mj-ea"/>
+                <a:cs typeface="+mj-cs"/>
+              </a:defRPr>
+            </a:lvl1pPr>
+          </a:lstStyle>
+          <a:p>
+            <a:r>
+              <a:rPr lang="es-EC" sz="4800" dirty="0">
+                <a:ln w="22225">
+                  <a:solidFill>
+                    <a:schemeClr val="tx1"/>
+                  </a:solidFill>
+                  <a:miter lim="800000"/>
+                </a:ln>
+                <a:noFill/>
+              </a:rPr>
+              <a:t>Dominio</a:t>
+            </a:r>
+            <a:r>
+              <a:rPr lang="en-US" sz="4800" dirty="0">
+                <a:ln w="22225">
+                  <a:solidFill>
+                    <a:schemeClr val="tx1"/>
+                  </a:solidFill>
+                  <a:miter lim="800000"/>
+                </a:ln>
+                <a:noFill/>
+              </a:rPr>
+              <a:t> = 50$</a:t>
+            </a:r>
+          </a:p>
+          <a:p>
+            <a:r>
+              <a:rPr lang="en-US" sz="4800" dirty="0">
+                <a:ln w="22225">
+                  <a:solidFill>
+                    <a:schemeClr val="tx1"/>
+                  </a:solidFill>
+                  <a:miter lim="800000"/>
+                </a:ln>
+                <a:noFill/>
+              </a:rPr>
+              <a:t>Host 98$ </a:t>
+            </a:r>
+            <a:r>
+              <a:rPr lang="es-EC" sz="4800" dirty="0">
+                <a:ln w="22225">
+                  <a:solidFill>
+                    <a:schemeClr val="tx1"/>
+                  </a:solidFill>
+                  <a:miter lim="800000"/>
+                </a:ln>
+                <a:noFill/>
+              </a:rPr>
+              <a:t>anual</a:t>
+            </a:r>
+          </a:p>
+        </p:txBody>
+      </p:sp>
+    </p:spTree>
+    <p:extLst>
+      <p:ext uri="{BB962C8B-B14F-4D97-AF65-F5344CB8AC3E}">
+        <p14:creationId xmlns:p14="http://schemas.microsoft.com/office/powerpoint/2010/main" val="4019283585"/>
+      </p:ext>
+    </p:extLst>
+  </p:cSld>
+  <p:clrMapOvr>
+    <a:overrideClrMapping bg1="dk1" tx1="lt1" bg2="dk2" tx2="lt2" accent1="accent1" accent2="accent2" accent3="accent3" accent4="accent4" accent5="accent5" accent6="accent6" hlink="hlink" folHlink="folHlink"/>
+  </p:clrMapOvr>
+  <p:timing>
+    <p:tnLst>
+      <p:par>
+        <p:cTn id="1" dur="indefinite" restart="never" nodeType="tmRoot">
+          <p:childTnLst>
+            <p:seq concurrent="1" nextAc="seek">
+              <p:cTn id="2" dur="indefinite" nodeType="mainSeq">
+                <p:childTnLst>
+                  <p:par>
+                    <p:cTn id="3" fill="hold">
+                      <p:stCondLst>
+                        <p:cond delay="indefinite"/>
+                        <p:cond evt="onBegin" delay="0">
+                          <p:tn val="2"/>
+                        </p:cond>
+                      </p:stCondLst>
+                      <p:childTnLst>
+                        <p:par>
+                          <p:cTn id="4" fill="hold">
+                            <p:stCondLst>
+                              <p:cond delay="0"/>
+                            </p:stCondLst>
+                            <p:childTnLst>
+                              <p:par>
+                                <p:cTn id="5" presetID="10" presetClass="entr" presetSubtype="0" fill="hold" grpId="0" nodeType="withEffect">
+                                  <p:stCondLst>
+                                    <p:cond delay="1000"/>
+                                  </p:stCondLst>
+                                  <p:iterate type="lt">
+                                    <p:tmPct val="10000"/>
+                                  </p:iterate>
+                                  <p:childTnLst>
+                                    <p:set>
+                                      <p:cBhvr>
+                                        <p:cTn id="6" dur="1" fill="hold">
+                                          <p:stCondLst>
+                                            <p:cond delay="0"/>
+                                          </p:stCondLst>
+                                        </p:cTn>
+                                        <p:tgtEl>
+                                          <p:spTgt spid="2"/>
+                                        </p:tgtEl>
+                                        <p:attrNameLst>
+                                          <p:attrName>style.visibility</p:attrName>
+                                        </p:attrNameLst>
+                                      </p:cBhvr>
+                                      <p:to>
+                                        <p:strVal val="visible"/>
+                                      </p:to>
+                                    </p:set>
+                                    <p:animEffect transition="in" filter="fade">
+                                      <p:cBhvr>
+                                        <p:cTn id="7" dur="400"/>
+                                        <p:tgtEl>
+                                          <p:spTgt spid="2"/>
+                                        </p:tgtEl>
+                                      </p:cBhvr>
+                                    </p:animEffect>
+                                  </p:childTnLst>
+                                </p:cTn>
+                              </p:par>
+                              <p:par>
+                                <p:cTn id="8" presetID="10" presetClass="entr" presetSubtype="0" fill="hold" grpId="0" nodeType="withEffect">
+                                  <p:stCondLst>
+                                    <p:cond delay="1000"/>
+                                  </p:stCondLst>
+                                  <p:iterate type="lt">
+                                    <p:tmPct val="10000"/>
+                                  </p:iterate>
+                                  <p:childTnLst>
+                                    <p:set>
+                                      <p:cBhvr>
+                                        <p:cTn id="9" dur="1" fill="hold">
+                                          <p:stCondLst>
+                                            <p:cond delay="0"/>
+                                          </p:stCondLst>
+                                        </p:cTn>
+                                        <p:tgtEl>
+                                          <p:spTgt spid="3"/>
+                                        </p:tgtEl>
+                                        <p:attrNameLst>
+                                          <p:attrName>style.visibility</p:attrName>
+                                        </p:attrNameLst>
+                                      </p:cBhvr>
+                                      <p:to>
+                                        <p:strVal val="visible"/>
+                                      </p:to>
+                                    </p:set>
+                                    <p:animEffect transition="in" filter="fade">
+                                      <p:cBhvr>
+                                        <p:cTn id="10" dur="400"/>
+                                        <p:tgtEl>
+                                          <p:spTgt spid="3"/>
+                                        </p:tgtEl>
+                                      </p:cBhvr>
+                                    </p:animEffect>
+                                  </p:childTnLst>
+                                </p:cTn>
+                              </p:par>
+                            </p:childTnLst>
+                          </p:cTn>
+                        </p:par>
+                      </p:childTnLst>
+                    </p:cTn>
+                  </p:par>
+                </p:childTnLst>
+              </p:cTn>
+              <p:prevCondLst>
+                <p:cond evt="onPrev" delay="0">
+                  <p:tgtEl>
+                    <p:sldTgt/>
+                  </p:tgtEl>
+                </p:cond>
+              </p:prevCondLst>
+              <p:nextCondLst>
+                <p:cond evt="onNext" delay="0">
+                  <p:tgtEl>
+                    <p:sldTgt/>
+                  </p:tgtEl>
+                </p:cond>
+              </p:nextCondLst>
+            </p:seq>
+          </p:childTnLst>
+        </p:cTn>
+      </p:par>
+    </p:tnLst>
+    <p:bldLst>
+      <p:bldP spid="2" grpId="0"/>
+      <p:bldP spid="3" grpId="0"/>
+    </p:bldLst>
+  </p:timing>
+</p:sld>
+</file>
+
+<file path=ppt/slides/slide9.xml><?xml version="1.0" encoding="utf-8"?>
+<p:sld xmlns:a="http://schemas.openxmlformats.org/drawingml/2006/main" xmlns:r="http://schemas.openxmlformats.org/officeDocument/2006/relationships" xmlns:p="http://schemas.openxmlformats.org/presentationml/2006/main">
+  <p:cSld>
+    <p:bg>
+      <p:bgPr>
+        <a:solidFill>
+          <a:schemeClr val="bg1"/>
+        </a:solidFill>
+        <a:effectLst/>
+      </p:bgPr>
+    </p:bg>
+    <p:spTree>
+      <p:nvGrpSpPr>
+        <p:cNvPr id="1" name=""/>
+        <p:cNvGrpSpPr/>
+        <p:nvPr/>
+      </p:nvGrpSpPr>
+      <p:grpSpPr>
+        <a:xfrm>
+          <a:off x="0" y="0"/>
+          <a:ext cx="0" cy="0"/>
+          <a:chOff x="0" y="0"/>
+          <a:chExt cx="0" cy="0"/>
+        </a:xfrm>
+      </p:grpSpPr>
+      <p:sp>
+        <p:nvSpPr>
+          <p:cNvPr id="9" name="Rectangle 8">
+            <a:extLst>
+              <a:ext uri="{FF2B5EF4-FFF2-40B4-BE49-F238E27FC236}">
+                <a16:creationId xmlns:a16="http://schemas.microsoft.com/office/drawing/2014/main" id="{AE2B703B-46F9-481A-A605-82E2A828C4FA}"/>
+              </a:ext>
+              <a:ext uri="{C183D7F6-B498-43B3-948B-1728B52AA6E4}">
+                <adec:decorative xmlns:adec="http://schemas.microsoft.com/office/drawing/2017/decorative" val="1"/>
+              </a:ext>
+            </a:extLst>
+          </p:cNvPr>
+          <p:cNvSpPr>
+            <a:spLocks noGrp="1" noRot="1" noChangeAspect="1" noMove="1" noResize="1" noEditPoints="1" noAdjustHandles="1" noChangeArrowheads="1" noChangeShapeType="1" noTextEdit="1"/>
+          </p:cNvSpPr>
+          <p:nvPr>
+            <p:extLst>
+              <p:ext uri="{386F3935-93C4-4BCD-93E2-E3B085C9AB24}">
+                <p16:designElem xmlns:p16="http://schemas.microsoft.com/office/powerpoint/2015/main" val="1"/>
+              </p:ext>
+            </p:extLst>
+          </p:nvPr>
+        </p:nvSpPr>
+        <p:spPr>
+          <a:xfrm>
+            <a:off x="0" y="0"/>
+            <a:ext cx="12192000" cy="6858000"/>
+          </a:xfrm>
+          <a:prstGeom prst="rect">
+            <a:avLst/>
+          </a:prstGeom>
+          <a:solidFill>
+            <a:schemeClr val="accent2"/>
+          </a:solidFill>
+          <a:ln>
+            <a:noFill/>
+          </a:ln>
+        </p:spPr>
+        <p:style>
+          <a:lnRef idx="2">
+            <a:schemeClr val="accent1">
+              <a:shade val="50000"/>
+            </a:schemeClr>
+          </a:lnRef>
+          <a:fillRef idx="1">
+            <a:schemeClr val="accent1"/>
+          </a:fillRef>
+          <a:effectRef idx="0">
+            <a:schemeClr val="accent1"/>
+          </a:effectRef>
+          <a:fontRef idx="minor">
+            <a:schemeClr val="lt1"/>
+          </a:fontRef>
+        </p:style>
+        <p:txBody>
+          <a:bodyPr rtlCol="0" anchor="ctr"/>
+          <a:lstStyle/>
+          <a:p>
+            <a:pPr algn="ctr"/>
+            <a:endParaRPr lang="en-US"/>
+          </a:p>
+        </p:txBody>
+      </p:sp>
+      <p:sp>
+        <p:nvSpPr>
+          <p:cNvPr id="2" name="Título 1">
+            <a:extLst>
+              <a:ext uri="{FF2B5EF4-FFF2-40B4-BE49-F238E27FC236}">
+                <a16:creationId xmlns:a16="http://schemas.microsoft.com/office/drawing/2014/main" id="{4FB3385D-57A9-8597-196E-1ED708F7FCF5}"/>
+              </a:ext>
+            </a:extLst>
+          </p:cNvPr>
+          <p:cNvSpPr>
+            <a:spLocks noGrp="1"/>
+          </p:cNvSpPr>
+          <p:nvPr>
+            <p:ph type="title"/>
+          </p:nvPr>
+        </p:nvSpPr>
+        <p:spPr>
+          <a:xfrm>
+            <a:off x="838200" y="459863"/>
+            <a:ext cx="10515600" cy="1004594"/>
+          </a:xfrm>
+        </p:spPr>
+        <p:txBody>
+          <a:bodyPr>
+            <a:normAutofit/>
+          </a:bodyPr>
+          <a:lstStyle/>
+          <a:p>
+            <a:pPr algn="ctr"/>
+            <a:r>
+              <a:rPr lang="es-ES">
+                <a:solidFill>
+                  <a:srgbClr val="FFFFFF"/>
+                </a:solidFill>
+              </a:rPr>
+              <a:t>LECCIONES APRENDIDAS</a:t>
+            </a:r>
+          </a:p>
+        </p:txBody>
+      </p:sp>
+      <p:sp>
+        <p:nvSpPr>
+          <p:cNvPr id="11" name="Rectangle: Rounded Corners 10">
+            <a:extLst>
+              <a:ext uri="{FF2B5EF4-FFF2-40B4-BE49-F238E27FC236}">
+                <a16:creationId xmlns:a16="http://schemas.microsoft.com/office/drawing/2014/main" id="{F13BE4D7-0C3D-4906-B230-A1C5B4665CCF}"/>
+              </a:ext>
+              <a:ext uri="{C183D7F6-B498-43B3-948B-1728B52AA6E4}">
+                <adec:decorative xmlns:adec="http://schemas.microsoft.com/office/drawing/2017/decorative" val="1"/>
+              </a:ext>
+            </a:extLst>
+          </p:cNvPr>
+          <p:cNvSpPr>
+            <a:spLocks noGrp="1" noRot="1" noChangeAspect="1" noMove="1" noResize="1" noEditPoints="1" noAdjustHandles="1" noChangeArrowheads="1" noChangeShapeType="1" noTextEdit="1"/>
+          </p:cNvSpPr>
+          <p:nvPr>
+            <p:extLst>
+              <p:ext uri="{386F3935-93C4-4BCD-93E2-E3B085C9AB24}">
+                <p16:designElem xmlns:p16="http://schemas.microsoft.com/office/powerpoint/2015/main" val="1"/>
+              </p:ext>
+            </p:extLst>
+          </p:nvPr>
+        </p:nvSpPr>
+        <p:spPr>
+          <a:xfrm>
+            <a:off x="579496" y="1587970"/>
+            <a:ext cx="11033008" cy="4768380"/>
+          </a:xfrm>
+          <a:prstGeom prst="roundRect">
+            <a:avLst>
+              <a:gd name="adj" fmla="val 3174"/>
+            </a:avLst>
+          </a:prstGeom>
+          <a:solidFill>
+            <a:schemeClr val="bg1">
+              <a:alpha val="95000"/>
+            </a:schemeClr>
+          </a:solidFill>
+          <a:ln>
+            <a:noFill/>
+          </a:ln>
+        </p:spPr>
+        <p:style>
+          <a:lnRef idx="2">
+            <a:schemeClr val="accent1">
+              <a:shade val="50000"/>
+            </a:schemeClr>
+          </a:lnRef>
+          <a:fillRef idx="1">
+            <a:schemeClr val="accent1"/>
+          </a:fillRef>
+          <a:effectRef idx="0">
+            <a:schemeClr val="accent1"/>
+          </a:effectRef>
+          <a:fontRef idx="minor">
+            <a:schemeClr val="lt1"/>
+          </a:fontRef>
+        </p:style>
+        <p:txBody>
+          <a:bodyPr rtlCol="0" anchor="ctr"/>
+          <a:lstStyle/>
+          <a:p>
+            <a:pPr algn="ctr"/>
+            <a:endParaRPr lang="en-US"/>
+          </a:p>
+        </p:txBody>
+      </p:sp>
+      <p:graphicFrame>
+        <p:nvGraphicFramePr>
+          <p:cNvPr id="5" name="Marcador de contenido 2">
+            <a:extLst>
+              <a:ext uri="{FF2B5EF4-FFF2-40B4-BE49-F238E27FC236}">
+                <a16:creationId xmlns:a16="http://schemas.microsoft.com/office/drawing/2014/main" id="{5D37F95D-62BC-882D-822A-6129930F8CE7}"/>
+              </a:ext>
+            </a:extLst>
+          </p:cNvPr>
+          <p:cNvGraphicFramePr>
+            <a:graphicFrameLocks noGrp="1"/>
+          </p:cNvGraphicFramePr>
+          <p:nvPr>
+            <p:ph idx="1"/>
+            <p:extLst>
+              <p:ext uri="{D42A27DB-BD31-4B8C-83A1-F6EECF244321}">
+                <p14:modId xmlns:p14="http://schemas.microsoft.com/office/powerpoint/2010/main" val="2186778652"/>
+              </p:ext>
+            </p:extLst>
+          </p:nvPr>
+        </p:nvGraphicFramePr>
+        <p:xfrm>
+          <a:off x="838200" y="1800911"/>
+          <a:ext cx="10515600" cy="4351338"/>
+        </p:xfrm>
+        <a:graphic>
+          <a:graphicData uri="http://schemas.openxmlformats.org/drawingml/2006/diagram">
+            <dgm:relIds xmlns:dgm="http://schemas.openxmlformats.org/drawingml/2006/diagram" xmlns:r="http://schemas.openxmlformats.org/officeDocument/2006/relationships" r:dm="rId2" r:lo="rId3" r:qs="rId4" r:cs="rId5"/>
+          </a:graphicData>
+        </a:graphic>
+      </p:graphicFrame>
+    </p:spTree>
+    <p:extLst>
+      <p:ext uri="{BB962C8B-B14F-4D97-AF65-F5344CB8AC3E}">
+        <p14:creationId xmlns:p14="http://schemas.microsoft.com/office/powerpoint/2010/main" val="3890509919"/>
+      </p:ext>
+    </p:extLst>
+  </p:cSld>
+  <p:clrMapOvr>
+    <a:masterClrMapping/>
+  </p:clrMapOvr>
+</p:sld>
+</file>
+
 <file path=ppt/theme/theme1.xml><?xml version="1.0" encoding="utf-8"?>
 <a:theme xmlns:a="http://schemas.openxmlformats.org/drawingml/2006/main" name="Tema de Office">
   <a:themeElements>

</xml_diff>